<commit_message>
talk workshop bpmn & ia
</commit_message>
<xml_diff>
--- a/presentations/LLM-Based_Generation_of_BPMN_Workflows_From_Textual_Descriptions.pptx
+++ b/presentations/LLM-Based_Generation_of_BPMN_Workflows_From_Textual_Descriptions.pptx
@@ -45,21 +45,26 @@
     <p:sldId id="290" r:id="rId40"/>
     <p:sldId id="291" r:id="rId41"/>
     <p:sldId id="292" r:id="rId42"/>
+    <p:sldId id="293" r:id="rId43"/>
+    <p:sldId id="294" r:id="rId44"/>
+    <p:sldId id="295" r:id="rId45"/>
+    <p:sldId id="296" r:id="rId46"/>
+    <p:sldId id="297" r:id="rId47"/>
   </p:sldIdLst>
   <p:sldSz cy="5143500" cx="9144000"/>
   <p:notesSz cx="6858000" cy="9144000"/>
   <p:embeddedFontLst>
     <p:embeddedFont>
       <p:font typeface="Lato"/>
-      <p:regular r:id="rId43"/>
-      <p:bold r:id="rId44"/>
-      <p:italic r:id="rId45"/>
-      <p:boldItalic r:id="rId46"/>
+      <p:regular r:id="rId48"/>
+      <p:bold r:id="rId49"/>
+      <p:italic r:id="rId50"/>
+      <p:boldItalic r:id="rId51"/>
     </p:embeddedFont>
     <p:embeddedFont>
       <p:font typeface="Maven Pro"/>
-      <p:regular r:id="rId47"/>
-      <p:bold r:id="rId48"/>
+      <p:regular r:id="rId52"/>
+      <p:bold r:id="rId53"/>
     </p:embeddedFont>
   </p:embeddedFontLst>
   <p:defaultTextStyle>
@@ -3612,7 +3617,7 @@
   <p:cSld>
     <p:spTree>
       <p:nvGrpSpPr>
-        <p:cNvPr id="536" name="Shape 536"/>
+        <p:cNvPr id="535" name="Shape 535"/>
         <p:cNvGrpSpPr/>
         <p:nvPr/>
       </p:nvGrpSpPr>
@@ -3626,7 +3631,7 @@
       </p:grpSpPr>
       <p:sp>
         <p:nvSpPr>
-          <p:cNvPr id="537" name="Google Shape;537;g2e0ac9892ee_0_21:notes"/>
+          <p:cNvPr id="536" name="Google Shape;536;g3573270d584_0_0:notes"/>
           <p:cNvSpPr/>
           <p:nvPr>
             <p:ph idx="2" type="sldImg"/>
@@ -3661,7 +3666,7 @@
       </p:sp>
       <p:sp>
         <p:nvSpPr>
-          <p:cNvPr id="538" name="Google Shape;538;g2e0ac9892ee_0_21:notes"/>
+          <p:cNvPr id="537" name="Google Shape;537;g3573270d584_0_0:notes"/>
           <p:cNvSpPr txBox="1"/>
           <p:nvPr>
             <p:ph idx="1" type="body"/>
@@ -3711,7 +3716,7 @@
   <p:cSld>
     <p:spTree>
       <p:nvGrpSpPr>
-        <p:cNvPr id="544" name="Shape 544"/>
+        <p:cNvPr id="549" name="Shape 549"/>
         <p:cNvGrpSpPr/>
         <p:nvPr/>
       </p:nvGrpSpPr>
@@ -3725,7 +3730,7 @@
       </p:grpSpPr>
       <p:sp>
         <p:nvSpPr>
-          <p:cNvPr id="545" name="Google Shape;545;g2e06e48000f_0_250:notes"/>
+          <p:cNvPr id="550" name="Google Shape;550;g3573270d584_0_29:notes"/>
           <p:cNvSpPr/>
           <p:nvPr>
             <p:ph idx="2" type="sldImg"/>
@@ -3760,7 +3765,205 @@
       </p:sp>
       <p:sp>
         <p:nvSpPr>
-          <p:cNvPr id="546" name="Google Shape;546;g2e06e48000f_0_250:notes"/>
+          <p:cNvPr id="551" name="Google Shape;551;g3573270d584_0_29:notes"/>
+          <p:cNvSpPr txBox="1"/>
+          <p:nvPr>
+            <p:ph idx="1" type="body"/>
+          </p:nvPr>
+        </p:nvSpPr>
+        <p:spPr>
+          <a:xfrm>
+            <a:off x="685800" y="4343400"/>
+            <a:ext cx="5486400" cy="4114800"/>
+          </a:xfrm>
+          <a:prstGeom prst="rect">
+            <a:avLst/>
+          </a:prstGeom>
+        </p:spPr>
+        <p:txBody>
+          <a:bodyPr anchorCtr="0" anchor="t" bIns="91425" lIns="91425" spcFirstLastPara="1" rIns="91425" wrap="square" tIns="91425">
+            <a:noAutofit/>
+          </a:bodyPr>
+          <a:lstStyle/>
+          <a:p>
+            <a:pPr indent="0" lvl="0" marL="0" rtl="0" algn="l">
+              <a:spcBef>
+                <a:spcPts val="0"/>
+              </a:spcBef>
+              <a:spcAft>
+                <a:spcPts val="0"/>
+              </a:spcAft>
+              <a:buNone/>
+            </a:pPr>
+            <a:r>
+              <a:t/>
+            </a:r>
+            <a:endParaRPr/>
+          </a:p>
+        </p:txBody>
+      </p:sp>
+    </p:spTree>
+  </p:cSld>
+  <p:clrMapOvr>
+    <a:masterClrMapping/>
+  </p:clrMapOvr>
+</p:notes>
+</file>
+
+<file path=ppt/notesSlides/notesSlide38.xml><?xml version="1.0" encoding="utf-8"?>
+<p:notes xmlns:a="http://schemas.openxmlformats.org/drawingml/2006/main" xmlns:r="http://schemas.openxmlformats.org/officeDocument/2006/relationships" xmlns:mc="http://schemas.openxmlformats.org/markup-compatibility/2006" xmlns:mv="urn:schemas-microsoft-com:mac:vml" xmlns:p="http://schemas.openxmlformats.org/presentationml/2006/main" xmlns:c="http://schemas.openxmlformats.org/drawingml/2006/chart" xmlns:dgm="http://schemas.openxmlformats.org/drawingml/2006/diagram" xmlns:o="urn:schemas-microsoft-com:office:office" xmlns:v="urn:schemas-microsoft-com:vml" xmlns:pvml="urn:schemas-microsoft-com:office:powerpoint" xmlns:com="http://schemas.openxmlformats.org/drawingml/2006/compatibility" xmlns:p14="http://schemas.microsoft.com/office/powerpoint/2010/main" xmlns:p15="http://schemas.microsoft.com/office/powerpoint/2012/main" xmlns:ahyp="http://schemas.microsoft.com/office/drawing/2018/hyperlinkcolor" showMasterPhAnim="0" showMasterSp="0">
+  <p:cSld>
+    <p:spTree>
+      <p:nvGrpSpPr>
+        <p:cNvPr id="563" name="Shape 563"/>
+        <p:cNvGrpSpPr/>
+        <p:nvPr/>
+      </p:nvGrpSpPr>
+      <p:grpSpPr>
+        <a:xfrm>
+          <a:off x="0" y="0"/>
+          <a:ext cx="0" cy="0"/>
+          <a:chOff x="0" y="0"/>
+          <a:chExt cx="0" cy="0"/>
+        </a:xfrm>
+      </p:grpSpPr>
+      <p:sp>
+        <p:nvSpPr>
+          <p:cNvPr id="564" name="Google Shape;564;g3573270d584_0_7:notes"/>
+          <p:cNvSpPr/>
+          <p:nvPr>
+            <p:ph idx="2" type="sldImg"/>
+          </p:nvPr>
+        </p:nvSpPr>
+        <p:spPr>
+          <a:xfrm>
+            <a:off x="381300" y="685800"/>
+            <a:ext cx="6096000" cy="3429000"/>
+          </a:xfrm>
+          <a:custGeom>
+            <a:rect b="b" l="l" r="r" t="t"/>
+            <a:pathLst>
+              <a:path extrusionOk="0" h="120000" w="120000">
+                <a:moveTo>
+                  <a:pt x="0" y="0"/>
+                </a:moveTo>
+                <a:lnTo>
+                  <a:pt x="120000" y="0"/>
+                </a:lnTo>
+                <a:lnTo>
+                  <a:pt x="120000" y="120000"/>
+                </a:lnTo>
+                <a:lnTo>
+                  <a:pt x="0" y="120000"/>
+                </a:lnTo>
+                <a:close/>
+              </a:path>
+            </a:pathLst>
+          </a:custGeom>
+        </p:spPr>
+      </p:sp>
+      <p:sp>
+        <p:nvSpPr>
+          <p:cNvPr id="565" name="Google Shape;565;g3573270d584_0_7:notes"/>
+          <p:cNvSpPr txBox="1"/>
+          <p:nvPr>
+            <p:ph idx="1" type="body"/>
+          </p:nvPr>
+        </p:nvSpPr>
+        <p:spPr>
+          <a:xfrm>
+            <a:off x="685800" y="4343400"/>
+            <a:ext cx="5486400" cy="4114800"/>
+          </a:xfrm>
+          <a:prstGeom prst="rect">
+            <a:avLst/>
+          </a:prstGeom>
+        </p:spPr>
+        <p:txBody>
+          <a:bodyPr anchorCtr="0" anchor="t" bIns="91425" lIns="91425" spcFirstLastPara="1" rIns="91425" wrap="square" tIns="91425">
+            <a:noAutofit/>
+          </a:bodyPr>
+          <a:lstStyle/>
+          <a:p>
+            <a:pPr indent="0" lvl="0" marL="0" rtl="0" algn="l">
+              <a:spcBef>
+                <a:spcPts val="0"/>
+              </a:spcBef>
+              <a:spcAft>
+                <a:spcPts val="0"/>
+              </a:spcAft>
+              <a:buNone/>
+            </a:pPr>
+            <a:r>
+              <a:t/>
+            </a:r>
+            <a:endParaRPr/>
+          </a:p>
+        </p:txBody>
+      </p:sp>
+    </p:spTree>
+  </p:cSld>
+  <p:clrMapOvr>
+    <a:masterClrMapping/>
+  </p:clrMapOvr>
+</p:notes>
+</file>
+
+<file path=ppt/notesSlides/notesSlide39.xml><?xml version="1.0" encoding="utf-8"?>
+<p:notes xmlns:a="http://schemas.openxmlformats.org/drawingml/2006/main" xmlns:r="http://schemas.openxmlformats.org/officeDocument/2006/relationships" xmlns:mc="http://schemas.openxmlformats.org/markup-compatibility/2006" xmlns:mv="urn:schemas-microsoft-com:mac:vml" xmlns:p="http://schemas.openxmlformats.org/presentationml/2006/main" xmlns:c="http://schemas.openxmlformats.org/drawingml/2006/chart" xmlns:dgm="http://schemas.openxmlformats.org/drawingml/2006/diagram" xmlns:o="urn:schemas-microsoft-com:office:office" xmlns:v="urn:schemas-microsoft-com:vml" xmlns:pvml="urn:schemas-microsoft-com:office:powerpoint" xmlns:com="http://schemas.openxmlformats.org/drawingml/2006/compatibility" xmlns:p14="http://schemas.microsoft.com/office/powerpoint/2010/main" xmlns:p15="http://schemas.microsoft.com/office/powerpoint/2012/main" xmlns:ahyp="http://schemas.microsoft.com/office/drawing/2018/hyperlinkcolor" showMasterPhAnim="0" showMasterSp="0">
+  <p:cSld>
+    <p:spTree>
+      <p:nvGrpSpPr>
+        <p:cNvPr id="571" name="Shape 571"/>
+        <p:cNvGrpSpPr/>
+        <p:nvPr/>
+      </p:nvGrpSpPr>
+      <p:grpSpPr>
+        <a:xfrm>
+          <a:off x="0" y="0"/>
+          <a:ext cx="0" cy="0"/>
+          <a:chOff x="0" y="0"/>
+          <a:chExt cx="0" cy="0"/>
+        </a:xfrm>
+      </p:grpSpPr>
+      <p:sp>
+        <p:nvSpPr>
+          <p:cNvPr id="572" name="Google Shape;572;g3573270d584_0_14:notes"/>
+          <p:cNvSpPr/>
+          <p:nvPr>
+            <p:ph idx="2" type="sldImg"/>
+          </p:nvPr>
+        </p:nvSpPr>
+        <p:spPr>
+          <a:xfrm>
+            <a:off x="381300" y="685800"/>
+            <a:ext cx="6096000" cy="3429000"/>
+          </a:xfrm>
+          <a:custGeom>
+            <a:rect b="b" l="l" r="r" t="t"/>
+            <a:pathLst>
+              <a:path extrusionOk="0" h="120000" w="120000">
+                <a:moveTo>
+                  <a:pt x="0" y="0"/>
+                </a:moveTo>
+                <a:lnTo>
+                  <a:pt x="120000" y="0"/>
+                </a:lnTo>
+                <a:lnTo>
+                  <a:pt x="120000" y="120000"/>
+                </a:lnTo>
+                <a:lnTo>
+                  <a:pt x="0" y="120000"/>
+                </a:lnTo>
+                <a:close/>
+              </a:path>
+            </a:pathLst>
+          </a:custGeom>
+        </p:spPr>
+      </p:sp>
+      <p:sp>
+        <p:nvSpPr>
+          <p:cNvPr id="573" name="Google Shape;573;g3573270d584_0_14:notes"/>
           <p:cNvSpPr txBox="1"/>
           <p:nvPr>
             <p:ph idx="1" type="body"/>
@@ -3860,6 +4063,303 @@
       <p:sp>
         <p:nvSpPr>
           <p:cNvPr id="107" name="Google Shape;107;g31964c7953c_0_2:notes"/>
+          <p:cNvSpPr txBox="1"/>
+          <p:nvPr>
+            <p:ph idx="1" type="body"/>
+          </p:nvPr>
+        </p:nvSpPr>
+        <p:spPr>
+          <a:xfrm>
+            <a:off x="685800" y="4343400"/>
+            <a:ext cx="5486400" cy="4114800"/>
+          </a:xfrm>
+          <a:prstGeom prst="rect">
+            <a:avLst/>
+          </a:prstGeom>
+        </p:spPr>
+        <p:txBody>
+          <a:bodyPr anchorCtr="0" anchor="t" bIns="91425" lIns="91425" spcFirstLastPara="1" rIns="91425" wrap="square" tIns="91425">
+            <a:noAutofit/>
+          </a:bodyPr>
+          <a:lstStyle/>
+          <a:p>
+            <a:pPr indent="0" lvl="0" marL="0" rtl="0" algn="l">
+              <a:spcBef>
+                <a:spcPts val="0"/>
+              </a:spcBef>
+              <a:spcAft>
+                <a:spcPts val="0"/>
+              </a:spcAft>
+              <a:buNone/>
+            </a:pPr>
+            <a:r>
+              <a:t/>
+            </a:r>
+            <a:endParaRPr/>
+          </a:p>
+        </p:txBody>
+      </p:sp>
+    </p:spTree>
+  </p:cSld>
+  <p:clrMapOvr>
+    <a:masterClrMapping/>
+  </p:clrMapOvr>
+</p:notes>
+</file>
+
+<file path=ppt/notesSlides/notesSlide40.xml><?xml version="1.0" encoding="utf-8"?>
+<p:notes xmlns:a="http://schemas.openxmlformats.org/drawingml/2006/main" xmlns:r="http://schemas.openxmlformats.org/officeDocument/2006/relationships" xmlns:mc="http://schemas.openxmlformats.org/markup-compatibility/2006" xmlns:mv="urn:schemas-microsoft-com:mac:vml" xmlns:p="http://schemas.openxmlformats.org/presentationml/2006/main" xmlns:c="http://schemas.openxmlformats.org/drawingml/2006/chart" xmlns:dgm="http://schemas.openxmlformats.org/drawingml/2006/diagram" xmlns:o="urn:schemas-microsoft-com:office:office" xmlns:v="urn:schemas-microsoft-com:vml" xmlns:pvml="urn:schemas-microsoft-com:office:powerpoint" xmlns:com="http://schemas.openxmlformats.org/drawingml/2006/compatibility" xmlns:p14="http://schemas.microsoft.com/office/powerpoint/2010/main" xmlns:p15="http://schemas.microsoft.com/office/powerpoint/2012/main" xmlns:ahyp="http://schemas.microsoft.com/office/drawing/2018/hyperlinkcolor" showMasterPhAnim="0" showMasterSp="0">
+  <p:cSld>
+    <p:spTree>
+      <p:nvGrpSpPr>
+        <p:cNvPr id="581" name="Shape 581"/>
+        <p:cNvGrpSpPr/>
+        <p:nvPr/>
+      </p:nvGrpSpPr>
+      <p:grpSpPr>
+        <a:xfrm>
+          <a:off x="0" y="0"/>
+          <a:ext cx="0" cy="0"/>
+          <a:chOff x="0" y="0"/>
+          <a:chExt cx="0" cy="0"/>
+        </a:xfrm>
+      </p:grpSpPr>
+      <p:sp>
+        <p:nvSpPr>
+          <p:cNvPr id="582" name="Google Shape;582;g3573270d584_0_70:notes"/>
+          <p:cNvSpPr/>
+          <p:nvPr>
+            <p:ph idx="2" type="sldImg"/>
+          </p:nvPr>
+        </p:nvSpPr>
+        <p:spPr>
+          <a:xfrm>
+            <a:off x="381300" y="685800"/>
+            <a:ext cx="6096000" cy="3429000"/>
+          </a:xfrm>
+          <a:custGeom>
+            <a:rect b="b" l="l" r="r" t="t"/>
+            <a:pathLst>
+              <a:path extrusionOk="0" h="120000" w="120000">
+                <a:moveTo>
+                  <a:pt x="0" y="0"/>
+                </a:moveTo>
+                <a:lnTo>
+                  <a:pt x="120000" y="0"/>
+                </a:lnTo>
+                <a:lnTo>
+                  <a:pt x="120000" y="120000"/>
+                </a:lnTo>
+                <a:lnTo>
+                  <a:pt x="0" y="120000"/>
+                </a:lnTo>
+                <a:close/>
+              </a:path>
+            </a:pathLst>
+          </a:custGeom>
+        </p:spPr>
+      </p:sp>
+      <p:sp>
+        <p:nvSpPr>
+          <p:cNvPr id="583" name="Google Shape;583;g3573270d584_0_70:notes"/>
+          <p:cNvSpPr txBox="1"/>
+          <p:nvPr>
+            <p:ph idx="1" type="body"/>
+          </p:nvPr>
+        </p:nvSpPr>
+        <p:spPr>
+          <a:xfrm>
+            <a:off x="685800" y="4343400"/>
+            <a:ext cx="5486400" cy="4114800"/>
+          </a:xfrm>
+          <a:prstGeom prst="rect">
+            <a:avLst/>
+          </a:prstGeom>
+        </p:spPr>
+        <p:txBody>
+          <a:bodyPr anchorCtr="0" anchor="t" bIns="91425" lIns="91425" spcFirstLastPara="1" rIns="91425" wrap="square" tIns="91425">
+            <a:noAutofit/>
+          </a:bodyPr>
+          <a:lstStyle/>
+          <a:p>
+            <a:pPr indent="0" lvl="0" marL="0" rtl="0" algn="l">
+              <a:spcBef>
+                <a:spcPts val="0"/>
+              </a:spcBef>
+              <a:spcAft>
+                <a:spcPts val="0"/>
+              </a:spcAft>
+              <a:buNone/>
+            </a:pPr>
+            <a:r>
+              <a:t/>
+            </a:r>
+            <a:endParaRPr/>
+          </a:p>
+        </p:txBody>
+      </p:sp>
+    </p:spTree>
+  </p:cSld>
+  <p:clrMapOvr>
+    <a:masterClrMapping/>
+  </p:clrMapOvr>
+</p:notes>
+</file>
+
+<file path=ppt/notesSlides/notesSlide41.xml><?xml version="1.0" encoding="utf-8"?>
+<p:notes xmlns:a="http://schemas.openxmlformats.org/drawingml/2006/main" xmlns:r="http://schemas.openxmlformats.org/officeDocument/2006/relationships" xmlns:mc="http://schemas.openxmlformats.org/markup-compatibility/2006" xmlns:mv="urn:schemas-microsoft-com:mac:vml" xmlns:p="http://schemas.openxmlformats.org/presentationml/2006/main" xmlns:c="http://schemas.openxmlformats.org/drawingml/2006/chart" xmlns:dgm="http://schemas.openxmlformats.org/drawingml/2006/diagram" xmlns:o="urn:schemas-microsoft-com:office:office" xmlns:v="urn:schemas-microsoft-com:vml" xmlns:pvml="urn:schemas-microsoft-com:office:powerpoint" xmlns:com="http://schemas.openxmlformats.org/drawingml/2006/compatibility" xmlns:p14="http://schemas.microsoft.com/office/powerpoint/2010/main" xmlns:p15="http://schemas.microsoft.com/office/powerpoint/2012/main" xmlns:ahyp="http://schemas.microsoft.com/office/drawing/2018/hyperlinkcolor" showMasterPhAnim="0" showMasterSp="0">
+  <p:cSld>
+    <p:spTree>
+      <p:nvGrpSpPr>
+        <p:cNvPr id="588" name="Shape 588"/>
+        <p:cNvGrpSpPr/>
+        <p:nvPr/>
+      </p:nvGrpSpPr>
+      <p:grpSpPr>
+        <a:xfrm>
+          <a:off x="0" y="0"/>
+          <a:ext cx="0" cy="0"/>
+          <a:chOff x="0" y="0"/>
+          <a:chExt cx="0" cy="0"/>
+        </a:xfrm>
+      </p:grpSpPr>
+      <p:sp>
+        <p:nvSpPr>
+          <p:cNvPr id="589" name="Google Shape;589;g2e0ac9892ee_0_21:notes"/>
+          <p:cNvSpPr/>
+          <p:nvPr>
+            <p:ph idx="2" type="sldImg"/>
+          </p:nvPr>
+        </p:nvSpPr>
+        <p:spPr>
+          <a:xfrm>
+            <a:off x="381300" y="685800"/>
+            <a:ext cx="6096000" cy="3429000"/>
+          </a:xfrm>
+          <a:custGeom>
+            <a:rect b="b" l="l" r="r" t="t"/>
+            <a:pathLst>
+              <a:path extrusionOk="0" h="120000" w="120000">
+                <a:moveTo>
+                  <a:pt x="0" y="0"/>
+                </a:moveTo>
+                <a:lnTo>
+                  <a:pt x="120000" y="0"/>
+                </a:lnTo>
+                <a:lnTo>
+                  <a:pt x="120000" y="120000"/>
+                </a:lnTo>
+                <a:lnTo>
+                  <a:pt x="0" y="120000"/>
+                </a:lnTo>
+                <a:close/>
+              </a:path>
+            </a:pathLst>
+          </a:custGeom>
+        </p:spPr>
+      </p:sp>
+      <p:sp>
+        <p:nvSpPr>
+          <p:cNvPr id="590" name="Google Shape;590;g2e0ac9892ee_0_21:notes"/>
+          <p:cNvSpPr txBox="1"/>
+          <p:nvPr>
+            <p:ph idx="1" type="body"/>
+          </p:nvPr>
+        </p:nvSpPr>
+        <p:spPr>
+          <a:xfrm>
+            <a:off x="685800" y="4343400"/>
+            <a:ext cx="5486400" cy="4114800"/>
+          </a:xfrm>
+          <a:prstGeom prst="rect">
+            <a:avLst/>
+          </a:prstGeom>
+        </p:spPr>
+        <p:txBody>
+          <a:bodyPr anchorCtr="0" anchor="t" bIns="91425" lIns="91425" spcFirstLastPara="1" rIns="91425" wrap="square" tIns="91425">
+            <a:noAutofit/>
+          </a:bodyPr>
+          <a:lstStyle/>
+          <a:p>
+            <a:pPr indent="0" lvl="0" marL="0" rtl="0" algn="l">
+              <a:spcBef>
+                <a:spcPts val="0"/>
+              </a:spcBef>
+              <a:spcAft>
+                <a:spcPts val="0"/>
+              </a:spcAft>
+              <a:buNone/>
+            </a:pPr>
+            <a:r>
+              <a:t/>
+            </a:r>
+            <a:endParaRPr/>
+          </a:p>
+        </p:txBody>
+      </p:sp>
+    </p:spTree>
+  </p:cSld>
+  <p:clrMapOvr>
+    <a:masterClrMapping/>
+  </p:clrMapOvr>
+</p:notes>
+</file>
+
+<file path=ppt/notesSlides/notesSlide42.xml><?xml version="1.0" encoding="utf-8"?>
+<p:notes xmlns:a="http://schemas.openxmlformats.org/drawingml/2006/main" xmlns:r="http://schemas.openxmlformats.org/officeDocument/2006/relationships" xmlns:mc="http://schemas.openxmlformats.org/markup-compatibility/2006" xmlns:mv="urn:schemas-microsoft-com:mac:vml" xmlns:p="http://schemas.openxmlformats.org/presentationml/2006/main" xmlns:c="http://schemas.openxmlformats.org/drawingml/2006/chart" xmlns:dgm="http://schemas.openxmlformats.org/drawingml/2006/diagram" xmlns:o="urn:schemas-microsoft-com:office:office" xmlns:v="urn:schemas-microsoft-com:vml" xmlns:pvml="urn:schemas-microsoft-com:office:powerpoint" xmlns:com="http://schemas.openxmlformats.org/drawingml/2006/compatibility" xmlns:p14="http://schemas.microsoft.com/office/powerpoint/2010/main" xmlns:p15="http://schemas.microsoft.com/office/powerpoint/2012/main" xmlns:ahyp="http://schemas.microsoft.com/office/drawing/2018/hyperlinkcolor" showMasterPhAnim="0" showMasterSp="0">
+  <p:cSld>
+    <p:spTree>
+      <p:nvGrpSpPr>
+        <p:cNvPr id="596" name="Shape 596"/>
+        <p:cNvGrpSpPr/>
+        <p:nvPr/>
+      </p:nvGrpSpPr>
+      <p:grpSpPr>
+        <a:xfrm>
+          <a:off x="0" y="0"/>
+          <a:ext cx="0" cy="0"/>
+          <a:chOff x="0" y="0"/>
+          <a:chExt cx="0" cy="0"/>
+        </a:xfrm>
+      </p:grpSpPr>
+      <p:sp>
+        <p:nvSpPr>
+          <p:cNvPr id="597" name="Google Shape;597;g2e06e48000f_0_250:notes"/>
+          <p:cNvSpPr/>
+          <p:nvPr>
+            <p:ph idx="2" type="sldImg"/>
+          </p:nvPr>
+        </p:nvSpPr>
+        <p:spPr>
+          <a:xfrm>
+            <a:off x="381300" y="685800"/>
+            <a:ext cx="6096000" cy="3429000"/>
+          </a:xfrm>
+          <a:custGeom>
+            <a:rect b="b" l="l" r="r" t="t"/>
+            <a:pathLst>
+              <a:path extrusionOk="0" h="120000" w="120000">
+                <a:moveTo>
+                  <a:pt x="0" y="0"/>
+                </a:moveTo>
+                <a:lnTo>
+                  <a:pt x="120000" y="0"/>
+                </a:lnTo>
+                <a:lnTo>
+                  <a:pt x="120000" y="120000"/>
+                </a:lnTo>
+                <a:lnTo>
+                  <a:pt x="0" y="120000"/>
+                </a:lnTo>
+                <a:close/>
+              </a:path>
+            </a:pathLst>
+          </a:custGeom>
+        </p:spPr>
+      </p:sp>
+      <p:sp>
+        <p:nvSpPr>
+          <p:cNvPr id="598" name="Google Shape;598;g2e06e48000f_0_250:notes"/>
           <p:cNvSpPr txBox="1"/>
           <p:nvPr>
             <p:ph idx="1" type="body"/>
@@ -24292,7 +24792,7 @@
             </a:pPr>
             <a:r>
               <a:rPr b="1" lang="fr" sz="1800"/>
-              <a:t>Tool – Presentation &amp; Experiments</a:t>
+              <a:t>Tool – Presentation</a:t>
             </a:r>
             <a:endParaRPr b="1" sz="1800"/>
           </a:p>
@@ -24314,8 +24814,8 @@
         </p:blipFill>
         <p:spPr>
           <a:xfrm>
-            <a:off x="561975" y="1337700"/>
-            <a:ext cx="6420923" cy="2970626"/>
+            <a:off x="411900" y="409050"/>
+            <a:ext cx="8320198" cy="3849326"/>
           </a:xfrm>
           <a:prstGeom prst="rect">
             <a:avLst/>
@@ -24326,37 +24826,9 @@
           </a:ln>
         </p:spPr>
       </p:pic>
-      <p:pic>
-        <p:nvPicPr>
+      <p:sp>
+        <p:nvSpPr>
           <p:cNvPr id="534" name="Google Shape;534;p47"/>
-          <p:cNvPicPr preferRelativeResize="0"/>
-          <p:nvPr/>
-        </p:nvPicPr>
-        <p:blipFill>
-          <a:blip r:embed="rId5">
-            <a:alphaModFix/>
-          </a:blip>
-          <a:stretch>
-            <a:fillRect/>
-          </a:stretch>
-        </p:blipFill>
-        <p:spPr>
-          <a:xfrm>
-            <a:off x="3780700" y="482079"/>
-            <a:ext cx="4798099" cy="1297900"/>
-          </a:xfrm>
-          <a:prstGeom prst="rect">
-            <a:avLst/>
-          </a:prstGeom>
-          <a:noFill/>
-          <a:ln>
-            <a:noFill/>
-          </a:ln>
-        </p:spPr>
-      </p:pic>
-      <p:sp>
-        <p:nvSpPr>
-          <p:cNvPr id="535" name="Google Shape;535;p47"/>
           <p:cNvSpPr txBox="1"/>
           <p:nvPr>
             <p:ph idx="12" type="sldNum"/>
@@ -24419,7 +24891,7 @@
     </p:bg>
     <p:spTree>
       <p:nvGrpSpPr>
-        <p:cNvPr id="539" name="Shape 539"/>
+        <p:cNvPr id="538" name="Shape 538"/>
         <p:cNvGrpSpPr/>
         <p:nvPr/>
       </p:nvGrpSpPr>
@@ -24433,7 +24905,7 @@
       </p:grpSpPr>
       <p:sp>
         <p:nvSpPr>
-          <p:cNvPr id="540" name="Google Shape;540;p48"/>
+          <p:cNvPr id="539" name="Google Shape;539;p48"/>
           <p:cNvSpPr txBox="1"/>
           <p:nvPr/>
         </p:nvSpPr>
@@ -24467,81 +24939,20 @@
             </a:pPr>
             <a:r>
               <a:rPr b="1" lang="fr" sz="1800"/>
-              <a:t>Tool – Online Version</a:t>
+              <a:t>Tool – Experiments: Quality of the Processes</a:t>
             </a:r>
             <a:endParaRPr b="1" sz="1800"/>
-          </a:p>
-        </p:txBody>
-      </p:sp>
-      <p:sp>
-        <p:nvSpPr>
-          <p:cNvPr id="541" name="Google Shape;541;p48"/>
-          <p:cNvSpPr txBox="1"/>
-          <p:nvPr/>
-        </p:nvSpPr>
-        <p:spPr>
-          <a:xfrm>
-            <a:off x="462000" y="3982050"/>
-            <a:ext cx="8220000" cy="393600"/>
-          </a:xfrm>
-          <a:prstGeom prst="rect">
-            <a:avLst/>
-          </a:prstGeom>
-          <a:noFill/>
-          <a:ln>
-            <a:noFill/>
-          </a:ln>
-        </p:spPr>
-        <p:txBody>
-          <a:bodyPr anchorCtr="0" anchor="t" bIns="91425" lIns="91425" spcFirstLastPara="1" rIns="91425" wrap="square" tIns="91425">
-            <a:noAutofit/>
-          </a:bodyPr>
-          <a:lstStyle/>
-          <a:p>
-            <a:pPr indent="0" lvl="0" marL="0" rtl="0" algn="l">
-              <a:spcBef>
-                <a:spcPts val="0"/>
-              </a:spcBef>
-              <a:spcAft>
-                <a:spcPts val="0"/>
-              </a:spcAft>
-              <a:buNone/>
-            </a:pPr>
-            <a:r>
-              <a:rPr lang="fr" sz="1800">
-                <a:solidFill>
-                  <a:schemeClr val="dk1"/>
-                </a:solidFill>
-              </a:rPr>
-              <a:t>Link:  </a:t>
-            </a:r>
-            <a:r>
-              <a:rPr lang="fr" sz="1800" u="sng">
-                <a:solidFill>
-                  <a:schemeClr val="hlink"/>
-                </a:solidFill>
-                <a:hlinkClick r:id="rId4"/>
-              </a:rPr>
-              <a:t>https://quentinnivon.github.io/pages/givup.html</a:t>
-            </a:r>
-            <a:endParaRPr sz="1800">
-              <a:solidFill>
-                <a:schemeClr val="dk1"/>
-              </a:solidFill>
-            </a:endParaRPr>
           </a:p>
         </p:txBody>
       </p:sp>
       <p:pic>
         <p:nvPicPr>
-          <p:cNvPr id="542" name="Google Shape;542;p48" title="gif_icsoc.mp4">
-            <a:hlinkClick r:id="rId5"/>
-          </p:cNvPr>
+          <p:cNvPr id="540" name="Google Shape;540;p48"/>
           <p:cNvPicPr preferRelativeResize="0"/>
           <p:nvPr/>
         </p:nvPicPr>
         <p:blipFill>
-          <a:blip r:embed="rId6">
+          <a:blip r:embed="rId4">
             <a:alphaModFix/>
           </a:blip>
           <a:stretch>
@@ -24550,8 +24961,8 @@
         </p:blipFill>
         <p:spPr>
           <a:xfrm>
-            <a:off x="462000" y="540500"/>
-            <a:ext cx="8220000" cy="3332000"/>
+            <a:off x="665900" y="1911554"/>
+            <a:ext cx="4798099" cy="1297900"/>
           </a:xfrm>
           <a:prstGeom prst="rect">
             <a:avLst/>
@@ -24564,7 +24975,7 @@
       </p:pic>
       <p:sp>
         <p:nvSpPr>
-          <p:cNvPr id="543" name="Google Shape;543;p48"/>
+          <p:cNvPr id="541" name="Google Shape;541;p48"/>
           <p:cNvSpPr txBox="1"/>
           <p:nvPr>
             <p:ph idx="12" type="sldNum"/>
@@ -24602,97 +25013,409 @@
           </a:p>
         </p:txBody>
       </p:sp>
+      <p:cxnSp>
+        <p:nvCxnSpPr>
+          <p:cNvPr id="542" name="Google Shape;542;p48"/>
+          <p:cNvCxnSpPr/>
+          <p:nvPr/>
+        </p:nvCxnSpPr>
+        <p:spPr>
+          <a:xfrm>
+            <a:off x="1697150" y="1239275"/>
+            <a:ext cx="430800" cy="655500"/>
+          </a:xfrm>
+          <a:prstGeom prst="straightConnector1">
+            <a:avLst/>
+          </a:prstGeom>
+          <a:noFill/>
+          <a:ln cap="flat" cmpd="sng" w="19050">
+            <a:solidFill>
+              <a:srgbClr val="6AA84F"/>
+            </a:solidFill>
+            <a:prstDash val="solid"/>
+            <a:round/>
+            <a:headEnd len="med" w="med" type="none"/>
+            <a:tailEnd len="med" w="med" type="triangle"/>
+          </a:ln>
+        </p:spPr>
+      </p:cxnSp>
+      <p:sp>
+        <p:nvSpPr>
+          <p:cNvPr id="543" name="Google Shape;543;p48"/>
+          <p:cNvSpPr txBox="1"/>
+          <p:nvPr/>
+        </p:nvSpPr>
+        <p:spPr>
+          <a:xfrm>
+            <a:off x="665900" y="523500"/>
+            <a:ext cx="1367100" cy="699000"/>
+          </a:xfrm>
+          <a:prstGeom prst="rect">
+            <a:avLst/>
+          </a:prstGeom>
+          <a:noFill/>
+          <a:ln>
+            <a:noFill/>
+          </a:ln>
+        </p:spPr>
+        <p:txBody>
+          <a:bodyPr anchorCtr="0" anchor="t" bIns="91425" lIns="91425" spcFirstLastPara="1" rIns="91425" wrap="square" tIns="91425">
+            <a:noAutofit/>
+          </a:bodyPr>
+          <a:lstStyle/>
+          <a:p>
+            <a:pPr indent="0" lvl="0" marL="0" rtl="0" algn="ctr">
+              <a:spcBef>
+                <a:spcPts val="0"/>
+              </a:spcBef>
+              <a:spcAft>
+                <a:spcPts val="0"/>
+              </a:spcAft>
+              <a:buNone/>
+            </a:pPr>
+            <a:r>
+              <a:rPr lang="fr" sz="1800">
+                <a:solidFill>
+                  <a:srgbClr val="6AA84F"/>
+                </a:solidFill>
+              </a:rPr>
+              <a:t>Correct</a:t>
+            </a:r>
+            <a:endParaRPr sz="1800">
+              <a:solidFill>
+                <a:srgbClr val="6AA84F"/>
+              </a:solidFill>
+            </a:endParaRPr>
+          </a:p>
+          <a:p>
+            <a:pPr indent="0" lvl="0" marL="0" rtl="0" algn="ctr">
+              <a:spcBef>
+                <a:spcPts val="0"/>
+              </a:spcBef>
+              <a:spcAft>
+                <a:spcPts val="0"/>
+              </a:spcAft>
+              <a:buNone/>
+            </a:pPr>
+            <a:r>
+              <a:rPr lang="fr" sz="1800">
+                <a:solidFill>
+                  <a:srgbClr val="6AA84F"/>
+                </a:solidFill>
+              </a:rPr>
+              <a:t>processes</a:t>
+            </a:r>
+            <a:endParaRPr sz="1800">
+              <a:solidFill>
+                <a:srgbClr val="6AA84F"/>
+              </a:solidFill>
+            </a:endParaRPr>
+          </a:p>
+        </p:txBody>
+      </p:sp>
+      <p:cxnSp>
+        <p:nvCxnSpPr>
+          <p:cNvPr id="544" name="Google Shape;544;p48"/>
+          <p:cNvCxnSpPr/>
+          <p:nvPr/>
+        </p:nvCxnSpPr>
+        <p:spPr>
+          <a:xfrm flipH="1">
+            <a:off x="2806050" y="1195600"/>
+            <a:ext cx="2100" cy="674100"/>
+          </a:xfrm>
+          <a:prstGeom prst="straightConnector1">
+            <a:avLst/>
+          </a:prstGeom>
+          <a:noFill/>
+          <a:ln cap="flat" cmpd="sng" w="19050">
+            <a:solidFill>
+              <a:srgbClr val="4A86E8"/>
+            </a:solidFill>
+            <a:prstDash val="solid"/>
+            <a:round/>
+            <a:headEnd len="med" w="med" type="none"/>
+            <a:tailEnd len="med" w="med" type="triangle"/>
+          </a:ln>
+        </p:spPr>
+      </p:cxnSp>
+      <p:sp>
+        <p:nvSpPr>
+          <p:cNvPr id="545" name="Google Shape;545;p48"/>
+          <p:cNvSpPr txBox="1"/>
+          <p:nvPr/>
+        </p:nvSpPr>
+        <p:spPr>
+          <a:xfrm>
+            <a:off x="2123550" y="523500"/>
+            <a:ext cx="1367100" cy="699000"/>
+          </a:xfrm>
+          <a:prstGeom prst="rect">
+            <a:avLst/>
+          </a:prstGeom>
+          <a:noFill/>
+          <a:ln>
+            <a:noFill/>
+          </a:ln>
+        </p:spPr>
+        <p:txBody>
+          <a:bodyPr anchorCtr="0" anchor="t" bIns="91425" lIns="91425" spcFirstLastPara="1" rIns="91425" wrap="square" tIns="91425">
+            <a:noAutofit/>
+          </a:bodyPr>
+          <a:lstStyle/>
+          <a:p>
+            <a:pPr indent="0" lvl="0" marL="0" rtl="0" algn="ctr">
+              <a:spcBef>
+                <a:spcPts val="0"/>
+              </a:spcBef>
+              <a:spcAft>
+                <a:spcPts val="0"/>
+              </a:spcAft>
+              <a:buNone/>
+            </a:pPr>
+            <a:r>
+              <a:rPr lang="fr" sz="1800">
+                <a:solidFill>
+                  <a:schemeClr val="accent1"/>
+                </a:solidFill>
+              </a:rPr>
+              <a:t>Ambiguous</a:t>
+            </a:r>
+            <a:endParaRPr sz="1800">
+              <a:solidFill>
+                <a:schemeClr val="accent1"/>
+              </a:solidFill>
+            </a:endParaRPr>
+          </a:p>
+          <a:p>
+            <a:pPr indent="0" lvl="0" marL="0" rtl="0" algn="ctr">
+              <a:spcBef>
+                <a:spcPts val="0"/>
+              </a:spcBef>
+              <a:spcAft>
+                <a:spcPts val="0"/>
+              </a:spcAft>
+              <a:buNone/>
+            </a:pPr>
+            <a:r>
+              <a:rPr lang="fr" sz="1800">
+                <a:solidFill>
+                  <a:schemeClr val="accent1"/>
+                </a:solidFill>
+              </a:rPr>
+              <a:t>processes</a:t>
+            </a:r>
+            <a:endParaRPr sz="1800">
+              <a:solidFill>
+                <a:schemeClr val="accent1"/>
+              </a:solidFill>
+            </a:endParaRPr>
+          </a:p>
+        </p:txBody>
+      </p:sp>
+      <p:cxnSp>
+        <p:nvCxnSpPr>
+          <p:cNvPr id="546" name="Google Shape;546;p48"/>
+          <p:cNvCxnSpPr/>
+          <p:nvPr/>
+        </p:nvCxnSpPr>
+        <p:spPr>
+          <a:xfrm flipH="1">
+            <a:off x="3407300" y="1239275"/>
+            <a:ext cx="537000" cy="630600"/>
+          </a:xfrm>
+          <a:prstGeom prst="straightConnector1">
+            <a:avLst/>
+          </a:prstGeom>
+          <a:noFill/>
+          <a:ln cap="flat" cmpd="sng" w="19050">
+            <a:solidFill>
+              <a:srgbClr val="FF0000"/>
+            </a:solidFill>
+            <a:prstDash val="solid"/>
+            <a:round/>
+            <a:headEnd len="med" w="med" type="none"/>
+            <a:tailEnd len="med" w="med" type="triangle"/>
+          </a:ln>
+        </p:spPr>
+      </p:cxnSp>
+      <p:sp>
+        <p:nvSpPr>
+          <p:cNvPr id="547" name="Google Shape;547;p48"/>
+          <p:cNvSpPr txBox="1"/>
+          <p:nvPr/>
+        </p:nvSpPr>
+        <p:spPr>
+          <a:xfrm>
+            <a:off x="3407300" y="536900"/>
+            <a:ext cx="1367100" cy="699000"/>
+          </a:xfrm>
+          <a:prstGeom prst="rect">
+            <a:avLst/>
+          </a:prstGeom>
+          <a:noFill/>
+          <a:ln>
+            <a:noFill/>
+          </a:ln>
+        </p:spPr>
+        <p:txBody>
+          <a:bodyPr anchorCtr="0" anchor="t" bIns="91425" lIns="91425" spcFirstLastPara="1" rIns="91425" wrap="square" tIns="91425">
+            <a:noAutofit/>
+          </a:bodyPr>
+          <a:lstStyle/>
+          <a:p>
+            <a:pPr indent="0" lvl="0" marL="0" rtl="0" algn="ctr">
+              <a:spcBef>
+                <a:spcPts val="0"/>
+              </a:spcBef>
+              <a:spcAft>
+                <a:spcPts val="0"/>
+              </a:spcAft>
+              <a:buNone/>
+            </a:pPr>
+            <a:r>
+              <a:rPr lang="fr" sz="1800">
+                <a:solidFill>
+                  <a:srgbClr val="FF0000"/>
+                </a:solidFill>
+              </a:rPr>
+              <a:t>Incorrect</a:t>
+            </a:r>
+            <a:endParaRPr sz="1800">
+              <a:solidFill>
+                <a:srgbClr val="FF0000"/>
+              </a:solidFill>
+            </a:endParaRPr>
+          </a:p>
+          <a:p>
+            <a:pPr indent="0" lvl="0" marL="0" rtl="0" algn="ctr">
+              <a:spcBef>
+                <a:spcPts val="0"/>
+              </a:spcBef>
+              <a:spcAft>
+                <a:spcPts val="0"/>
+              </a:spcAft>
+              <a:buNone/>
+            </a:pPr>
+            <a:r>
+              <a:rPr lang="fr" sz="1800">
+                <a:solidFill>
+                  <a:srgbClr val="FF0000"/>
+                </a:solidFill>
+              </a:rPr>
+              <a:t>processes</a:t>
+            </a:r>
+            <a:endParaRPr sz="1800">
+              <a:solidFill>
+                <a:srgbClr val="FF0000"/>
+              </a:solidFill>
+            </a:endParaRPr>
+          </a:p>
+        </p:txBody>
+      </p:sp>
+      <p:sp>
+        <p:nvSpPr>
+          <p:cNvPr id="548" name="Google Shape;548;p48"/>
+          <p:cNvSpPr txBox="1"/>
+          <p:nvPr/>
+        </p:nvSpPr>
+        <p:spPr>
+          <a:xfrm>
+            <a:off x="5806950" y="1222500"/>
+            <a:ext cx="2665500" cy="2472000"/>
+          </a:xfrm>
+          <a:prstGeom prst="rect">
+            <a:avLst/>
+          </a:prstGeom>
+          <a:noFill/>
+          <a:ln>
+            <a:noFill/>
+          </a:ln>
+        </p:spPr>
+        <p:txBody>
+          <a:bodyPr anchorCtr="0" anchor="t" bIns="91425" lIns="91425" spcFirstLastPara="1" rIns="91425" wrap="square" tIns="91425">
+            <a:noAutofit/>
+          </a:bodyPr>
+          <a:lstStyle/>
+          <a:p>
+            <a:pPr indent="0" lvl="0" marL="0" rtl="0" algn="l">
+              <a:spcBef>
+                <a:spcPts val="0"/>
+              </a:spcBef>
+              <a:spcAft>
+                <a:spcPts val="0"/>
+              </a:spcAft>
+              <a:buNone/>
+            </a:pPr>
+            <a:r>
+              <a:rPr lang="fr" sz="1800">
+                <a:solidFill>
+                  <a:schemeClr val="dk1"/>
+                </a:solidFill>
+              </a:rPr>
+              <a:t>An </a:t>
+            </a:r>
+            <a:r>
+              <a:rPr b="1" lang="fr" sz="1800">
+                <a:solidFill>
+                  <a:srgbClr val="4A86E8"/>
+                </a:solidFill>
+              </a:rPr>
+              <a:t>ambiguous process</a:t>
+            </a:r>
+            <a:r>
+              <a:rPr lang="fr" sz="1800">
+                <a:solidFill>
+                  <a:schemeClr val="dk1"/>
+                </a:solidFill>
+              </a:rPr>
+              <a:t> is a process that is </a:t>
+            </a:r>
+            <a:r>
+              <a:rPr b="1" lang="fr" sz="1800">
+                <a:solidFill>
+                  <a:srgbClr val="4A86E8"/>
+                </a:solidFill>
+              </a:rPr>
+              <a:t>not incorrect</a:t>
+            </a:r>
+            <a:r>
+              <a:rPr lang="fr" sz="1800">
+                <a:solidFill>
+                  <a:schemeClr val="dk1"/>
+                </a:solidFill>
+              </a:rPr>
+              <a:t> with regards to the description, but which </a:t>
+            </a:r>
+            <a:r>
+              <a:rPr b="1" lang="fr" sz="1800">
+                <a:solidFill>
+                  <a:srgbClr val="4A86E8"/>
+                </a:solidFill>
+              </a:rPr>
+              <a:t>does not correspond to the expectations</a:t>
+            </a:r>
+            <a:r>
+              <a:rPr lang="fr" sz="1800">
+                <a:solidFill>
+                  <a:schemeClr val="dk1"/>
+                </a:solidFill>
+              </a:rPr>
+              <a:t> of the experts.</a:t>
+            </a:r>
+            <a:endParaRPr sz="1800">
+              <a:solidFill>
+                <a:schemeClr val="dk1"/>
+              </a:solidFill>
+            </a:endParaRPr>
+          </a:p>
+        </p:txBody>
+      </p:sp>
     </p:spTree>
   </p:cSld>
   <p:clrMapOvr>
     <a:masterClrMapping/>
   </p:clrMapOvr>
-  <p:timing>
-    <p:tnLst>
-      <p:par>
-        <p:cTn dur="indefinite" nodeType="tmRoot" restart="never">
-          <p:childTnLst>
-            <p:seq concurrent="1" nextAc="seek">
-              <p:cTn dur="indefinite" id="2" nodeType="mainSeq">
-                <p:childTnLst>
-                  <p:par>
-                    <p:cTn fill="hold">
-                      <p:stCondLst>
-                        <p:cond delay="indefinite"/>
-                        <p:cond evt="onBegin" delay="0">
-                          <p:tn val="2"/>
-                        </p:cond>
-                      </p:stCondLst>
-                      <p:childTnLst>
-                        <p:par>
-                          <p:cTn fill="hold">
-                            <p:stCondLst>
-                              <p:cond delay="0"/>
-                            </p:stCondLst>
-                            <p:childTnLst>
-                              <p:par>
-                                <p:cTn fill="hold" nodeType="withEffect" presetClass="entr" presetID="10" presetSubtype="0">
-                                  <p:stCondLst>
-                                    <p:cond delay="0"/>
-                                  </p:stCondLst>
-                                  <p:childTnLst>
-                                    <p:set>
-                                      <p:cBhvr>
-                                        <p:cTn dur="1" fill="hold">
-                                          <p:stCondLst>
-                                            <p:cond delay="0"/>
-                                          </p:stCondLst>
-                                        </p:cTn>
-                                        <p:tgtEl>
-                                          <p:spTgt spid="542"/>
-                                        </p:tgtEl>
-                                        <p:attrNameLst>
-                                          <p:attrName>style.visibility</p:attrName>
-                                        </p:attrNameLst>
-                                      </p:cBhvr>
-                                      <p:to>
-                                        <p:strVal val="visible"/>
-                                      </p:to>
-                                    </p:set>
-                                    <p:animEffect filter="fade" transition="in">
-                                      <p:cBhvr>
-                                        <p:cTn dur="1000"/>
-                                        <p:tgtEl>
-                                          <p:spTgt spid="542"/>
-                                        </p:tgtEl>
-                                      </p:cBhvr>
-                                    </p:animEffect>
-                                  </p:childTnLst>
-                                </p:cTn>
-                              </p:par>
-                            </p:childTnLst>
-                          </p:cTn>
-                        </p:par>
-                      </p:childTnLst>
-                    </p:cTn>
-                  </p:par>
-                </p:childTnLst>
-              </p:cTn>
-              <p:prevCondLst>
-                <p:cond evt="onPrev">
-                  <p:tgtEl>
-                    <p:sldTgt/>
-                  </p:tgtEl>
-                </p:cond>
-              </p:prevCondLst>
-              <p:nextCondLst>
-                <p:cond evt="onNext">
-                  <p:tgtEl>
-                    <p:sldTgt/>
-                  </p:tgtEl>
-                </p:cond>
-              </p:nextCondLst>
-            </p:seq>
-          </p:childTnLst>
-        </p:cTn>
-      </p:par>
-    </p:tnLst>
-  </p:timing>
 </p:sld>
 </file>
 
@@ -24713,7 +25436,7 @@
     </p:bg>
     <p:spTree>
       <p:nvGrpSpPr>
-        <p:cNvPr id="547" name="Shape 547"/>
+        <p:cNvPr id="552" name="Shape 552"/>
         <p:cNvGrpSpPr/>
         <p:nvPr/>
       </p:nvGrpSpPr>
@@ -24727,7 +25450,7 @@
       </p:grpSpPr>
       <p:sp>
         <p:nvSpPr>
-          <p:cNvPr id="548" name="Google Shape;548;p49"/>
+          <p:cNvPr id="553" name="Google Shape;553;p49"/>
           <p:cNvSpPr txBox="1"/>
           <p:nvPr/>
         </p:nvSpPr>
@@ -24761,7 +25484,15 @@
             </a:pPr>
             <a:r>
               <a:rPr b="1" lang="fr" sz="1800"/>
-              <a:t>Conclusion</a:t>
+              <a:t>Tool – Experiments: </a:t>
+            </a:r>
+            <a:r>
+              <a:rPr b="1" lang="fr" sz="1800"/>
+              <a:t>Ambiguous</a:t>
+            </a:r>
+            <a:r>
+              <a:rPr b="1" lang="fr" sz="1800"/>
+              <a:t> Processes</a:t>
             </a:r>
             <a:endParaRPr b="1" sz="1800"/>
           </a:p>
@@ -24769,328 +25500,7 @@
       </p:sp>
       <p:sp>
         <p:nvSpPr>
-          <p:cNvPr id="549" name="Google Shape;549;p49"/>
-          <p:cNvSpPr txBox="1"/>
-          <p:nvPr/>
-        </p:nvSpPr>
-        <p:spPr>
-          <a:xfrm>
-            <a:off x="727650" y="541275"/>
-            <a:ext cx="7688700" cy="3991500"/>
-          </a:xfrm>
-          <a:prstGeom prst="rect">
-            <a:avLst/>
-          </a:prstGeom>
-          <a:noFill/>
-          <a:ln>
-            <a:noFill/>
-          </a:ln>
-        </p:spPr>
-        <p:txBody>
-          <a:bodyPr anchorCtr="0" anchor="t" bIns="91425" lIns="91425" spcFirstLastPara="1" rIns="91425" wrap="square" tIns="91425">
-            <a:normAutofit/>
-          </a:bodyPr>
-          <a:lstStyle/>
-          <a:p>
-            <a:pPr indent="0" lvl="0" marL="0" rtl="0" algn="l">
-              <a:lnSpc>
-                <a:spcPct val="115000"/>
-              </a:lnSpc>
-              <a:spcBef>
-                <a:spcPts val="0"/>
-              </a:spcBef>
-              <a:spcAft>
-                <a:spcPts val="0"/>
-              </a:spcAft>
-              <a:buNone/>
-            </a:pPr>
-            <a:r>
-              <a:rPr lang="fr" sz="1800">
-                <a:latin typeface="Lato"/>
-                <a:ea typeface="Lato"/>
-                <a:cs typeface="Lato"/>
-                <a:sym typeface="Lato"/>
-              </a:rPr>
-              <a:t>In this work, we proposed a </a:t>
-            </a:r>
-            <a:r>
-              <a:rPr b="1" lang="fr" sz="1800">
-                <a:solidFill>
-                  <a:srgbClr val="FF0000"/>
-                </a:solidFill>
-                <a:latin typeface="Lato"/>
-                <a:ea typeface="Lato"/>
-                <a:cs typeface="Lato"/>
-                <a:sym typeface="Lato"/>
-              </a:rPr>
-              <a:t>9 steps approach</a:t>
-            </a:r>
-            <a:r>
-              <a:rPr lang="fr" sz="1800">
-                <a:latin typeface="Lato"/>
-                <a:ea typeface="Lato"/>
-                <a:cs typeface="Lato"/>
-                <a:sym typeface="Lato"/>
-              </a:rPr>
-              <a:t> aiming at automatically designing </a:t>
-            </a:r>
-            <a:r>
-              <a:rPr b="1" lang="fr" sz="1800">
-                <a:solidFill>
-                  <a:srgbClr val="FF0000"/>
-                </a:solidFill>
-                <a:latin typeface="Lato"/>
-                <a:ea typeface="Lato"/>
-                <a:cs typeface="Lato"/>
-                <a:sym typeface="Lato"/>
-              </a:rPr>
-              <a:t>syntactically and semantically correct BPMN</a:t>
-            </a:r>
-            <a:r>
-              <a:rPr lang="fr" sz="1800">
-                <a:latin typeface="Lato"/>
-                <a:ea typeface="Lato"/>
-                <a:cs typeface="Lato"/>
-                <a:sym typeface="Lato"/>
-              </a:rPr>
-              <a:t> processes from a </a:t>
-            </a:r>
-            <a:r>
-              <a:rPr b="1" lang="fr" sz="1800">
-                <a:solidFill>
-                  <a:srgbClr val="FF0000"/>
-                </a:solidFill>
-                <a:latin typeface="Lato"/>
-                <a:ea typeface="Lato"/>
-                <a:cs typeface="Lato"/>
-                <a:sym typeface="Lato"/>
-              </a:rPr>
-              <a:t>textual description</a:t>
-            </a:r>
-            <a:r>
-              <a:rPr lang="fr" sz="1800">
-                <a:latin typeface="Lato"/>
-                <a:ea typeface="Lato"/>
-                <a:cs typeface="Lato"/>
-                <a:sym typeface="Lato"/>
-              </a:rPr>
-              <a:t> of the requirements.</a:t>
-            </a:r>
-            <a:br>
-              <a:rPr lang="fr" sz="1800">
-                <a:latin typeface="Lato"/>
-                <a:ea typeface="Lato"/>
-                <a:cs typeface="Lato"/>
-                <a:sym typeface="Lato"/>
-              </a:rPr>
-            </a:br>
-            <a:endParaRPr sz="1800">
-              <a:latin typeface="Lato"/>
-              <a:ea typeface="Lato"/>
-              <a:cs typeface="Lato"/>
-              <a:sym typeface="Lato"/>
-            </a:endParaRPr>
-          </a:p>
-          <a:p>
-            <a:pPr indent="0" lvl="0" marL="0" rtl="0" algn="l">
-              <a:lnSpc>
-                <a:spcPct val="115000"/>
-              </a:lnSpc>
-              <a:spcBef>
-                <a:spcPts val="1200"/>
-              </a:spcBef>
-              <a:spcAft>
-                <a:spcPts val="0"/>
-              </a:spcAft>
-              <a:buNone/>
-            </a:pPr>
-            <a:r>
-              <a:rPr lang="fr" sz="1800">
-                <a:latin typeface="Lato"/>
-                <a:ea typeface="Lato"/>
-                <a:cs typeface="Lato"/>
-                <a:sym typeface="Lato"/>
-              </a:rPr>
-              <a:t>This work offers several </a:t>
-            </a:r>
-            <a:r>
-              <a:rPr b="1" lang="fr" sz="1800">
-                <a:solidFill>
-                  <a:srgbClr val="FF0000"/>
-                </a:solidFill>
-                <a:latin typeface="Lato"/>
-                <a:ea typeface="Lato"/>
-                <a:cs typeface="Lato"/>
-                <a:sym typeface="Lato"/>
-              </a:rPr>
-              <a:t>perspectives</a:t>
-            </a:r>
-            <a:r>
-              <a:rPr lang="fr" sz="1800">
-                <a:latin typeface="Lato"/>
-                <a:ea typeface="Lato"/>
-                <a:cs typeface="Lato"/>
-                <a:sym typeface="Lato"/>
-              </a:rPr>
-              <a:t>:</a:t>
-            </a:r>
-            <a:endParaRPr sz="1800">
-              <a:latin typeface="Lato"/>
-              <a:ea typeface="Lato"/>
-              <a:cs typeface="Lato"/>
-              <a:sym typeface="Lato"/>
-            </a:endParaRPr>
-          </a:p>
-          <a:p>
-            <a:pPr indent="-342900" lvl="0" marL="457200" rtl="0" algn="l">
-              <a:lnSpc>
-                <a:spcPct val="115000"/>
-              </a:lnSpc>
-              <a:spcBef>
-                <a:spcPts val="1200"/>
-              </a:spcBef>
-              <a:spcAft>
-                <a:spcPts val="0"/>
-              </a:spcAft>
-              <a:buSzPts val="1800"/>
-              <a:buFont typeface="Lato"/>
-              <a:buChar char="●"/>
-            </a:pPr>
-            <a:r>
-              <a:rPr lang="fr" sz="1800">
-                <a:latin typeface="Lato"/>
-                <a:ea typeface="Lato"/>
-                <a:cs typeface="Lato"/>
-                <a:sym typeface="Lato"/>
-              </a:rPr>
-              <a:t>Get rid of ASTs to allow more complex constructs (</a:t>
-            </a:r>
-            <a:r>
-              <a:rPr lang="fr" sz="1800">
-                <a:latin typeface="Lato"/>
-                <a:ea typeface="Lato"/>
-                <a:cs typeface="Lato"/>
-                <a:sym typeface="Lato"/>
-              </a:rPr>
-              <a:t>intricate</a:t>
-            </a:r>
-            <a:r>
-              <a:rPr lang="fr" sz="1800">
-                <a:latin typeface="Lato"/>
-                <a:ea typeface="Lato"/>
-                <a:cs typeface="Lato"/>
-                <a:sym typeface="Lato"/>
-              </a:rPr>
-              <a:t> loops/unbalanced gateways)</a:t>
-            </a:r>
-            <a:endParaRPr sz="1800">
-              <a:latin typeface="Lato"/>
-              <a:ea typeface="Lato"/>
-              <a:cs typeface="Lato"/>
-              <a:sym typeface="Lato"/>
-            </a:endParaRPr>
-          </a:p>
-          <a:p>
-            <a:pPr indent="-342900" lvl="0" marL="457200" rtl="0" algn="l">
-              <a:lnSpc>
-                <a:spcPct val="115000"/>
-              </a:lnSpc>
-              <a:spcBef>
-                <a:spcPts val="0"/>
-              </a:spcBef>
-              <a:spcAft>
-                <a:spcPts val="0"/>
-              </a:spcAft>
-              <a:buSzPts val="1800"/>
-              <a:buFont typeface="Lato"/>
-              <a:buChar char="●"/>
-            </a:pPr>
-            <a:r>
-              <a:rPr lang="fr" sz="1800">
-                <a:latin typeface="Lato"/>
-                <a:ea typeface="Lato"/>
-                <a:cs typeface="Lato"/>
-                <a:sym typeface="Lato"/>
-              </a:rPr>
-              <a:t>Formalise the transformation operations</a:t>
-            </a:r>
-            <a:endParaRPr sz="1800">
-              <a:latin typeface="Lato"/>
-              <a:ea typeface="Lato"/>
-              <a:cs typeface="Lato"/>
-              <a:sym typeface="Lato"/>
-            </a:endParaRPr>
-          </a:p>
-          <a:p>
-            <a:pPr indent="-342900" lvl="0" marL="457200" rtl="0" algn="l">
-              <a:lnSpc>
-                <a:spcPct val="115000"/>
-              </a:lnSpc>
-              <a:spcBef>
-                <a:spcPts val="0"/>
-              </a:spcBef>
-              <a:spcAft>
-                <a:spcPts val="0"/>
-              </a:spcAft>
-              <a:buSzPts val="1800"/>
-              <a:buFont typeface="Lato"/>
-              <a:buChar char="●"/>
-            </a:pPr>
-            <a:r>
-              <a:rPr lang="fr" sz="1800">
-                <a:solidFill>
-                  <a:schemeClr val="dk1"/>
-                </a:solidFill>
-                <a:latin typeface="Lato"/>
-                <a:ea typeface="Lato"/>
-                <a:cs typeface="Lato"/>
-                <a:sym typeface="Lato"/>
-              </a:rPr>
-              <a:t>Add new features (such as model checking of textual properties)</a:t>
-            </a:r>
-            <a:endParaRPr sz="1800">
-              <a:latin typeface="Lato"/>
-              <a:ea typeface="Lato"/>
-              <a:cs typeface="Lato"/>
-              <a:sym typeface="Lato"/>
-            </a:endParaRPr>
-          </a:p>
-          <a:p>
-            <a:pPr indent="-342900" lvl="0" marL="457200" rtl="0" algn="l">
-              <a:lnSpc>
-                <a:spcPct val="115000"/>
-              </a:lnSpc>
-              <a:spcBef>
-                <a:spcPts val="0"/>
-              </a:spcBef>
-              <a:spcAft>
-                <a:spcPts val="0"/>
-              </a:spcAft>
-              <a:buSzPts val="1800"/>
-              <a:buFont typeface="Lato"/>
-              <a:buChar char="●"/>
-            </a:pPr>
-            <a:r>
-              <a:rPr lang="fr" sz="1800">
-                <a:latin typeface="Lato"/>
-                <a:ea typeface="Lato"/>
-                <a:cs typeface="Lato"/>
-                <a:sym typeface="Lato"/>
-              </a:rPr>
-              <a:t>Adapt the description to (visual) process changes</a:t>
-            </a:r>
-            <a:endParaRPr sz="1800">
-              <a:latin typeface="Lato"/>
-              <a:ea typeface="Lato"/>
-              <a:cs typeface="Lato"/>
-              <a:sym typeface="Lato"/>
-            </a:endParaRPr>
-          </a:p>
-        </p:txBody>
-      </p:sp>
-      <p:sp>
-        <p:nvSpPr>
-          <p:cNvPr id="550" name="Google Shape;550;p49"/>
+          <p:cNvPr id="554" name="Google Shape;554;p49"/>
           <p:cNvSpPr txBox="1"/>
           <p:nvPr>
             <p:ph idx="12" type="sldNum"/>
@@ -25130,25 +25540,26 @@
       </p:sp>
       <p:sp>
         <p:nvSpPr>
-          <p:cNvPr id="551" name="Google Shape;551;p49"/>
+          <p:cNvPr id="555" name="Google Shape;555;p49"/>
           <p:cNvSpPr/>
           <p:nvPr/>
         </p:nvSpPr>
         <p:spPr>
           <a:xfrm>
-            <a:off x="7259400" y="2466675"/>
-            <a:ext cx="358500" cy="944400"/>
-          </a:xfrm>
-          <a:prstGeom prst="rightBrace">
+            <a:off x="640025" y="2183650"/>
+            <a:ext cx="1219500" cy="425700"/>
+          </a:xfrm>
+          <a:prstGeom prst="roundRect">
             <a:avLst>
-              <a:gd fmla="val 50000" name="adj1"/>
-              <a:gd fmla="val 50000" name="adj2"/>
+              <a:gd fmla="val 16667" name="adj"/>
             </a:avLst>
           </a:prstGeom>
-          <a:noFill/>
-          <a:ln cap="flat" cmpd="sng" w="19050">
+          <a:solidFill>
+            <a:srgbClr val="FFF2CC"/>
+          </a:solidFill>
+          <a:ln cap="flat" cmpd="sng" w="28575">
             <a:solidFill>
-              <a:srgbClr val="4A86E8"/>
+              <a:srgbClr val="BF9000"/>
             </a:solidFill>
             <a:prstDash val="solid"/>
             <a:round/>
@@ -25162,36 +25573,59 @@
           </a:bodyPr>
           <a:lstStyle/>
           <a:p>
-            <a:pPr indent="0" lvl="0" marL="0" rtl="0" algn="ctr">
-              <a:spcBef>
-                <a:spcPts val="0"/>
-              </a:spcBef>
-              <a:spcAft>
-                <a:spcPts val="0"/>
-              </a:spcAft>
-              <a:buNone/>
-            </a:pPr>
-            <a:r>
-              <a:t/>
-            </a:r>
-            <a:endParaRPr>
-              <a:solidFill>
-                <a:srgbClr val="0000FF"/>
-              </a:solidFill>
+            <a:pPr indent="0" lvl="0" marL="0" rtl="0" algn="l">
+              <a:spcBef>
+                <a:spcPts val="0"/>
+              </a:spcBef>
+              <a:spcAft>
+                <a:spcPts val="0"/>
+              </a:spcAft>
+              <a:buClr>
+                <a:schemeClr val="dk1"/>
+              </a:buClr>
+              <a:buSzPts val="1100"/>
+              <a:buFont typeface="Arial"/>
+              <a:buNone/>
+            </a:pPr>
+            <a:r>
+              <a:rPr lang="fr">
+                <a:solidFill>
+                  <a:schemeClr val="dk1"/>
+                </a:solidFill>
+                <a:latin typeface="Maven Pro"/>
+                <a:ea typeface="Maven Pro"/>
+                <a:cs typeface="Maven Pro"/>
+                <a:sym typeface="Maven Pro"/>
+              </a:rPr>
+              <a:t>I want A B C</a:t>
+            </a:r>
+            <a:endParaRPr sz="1700">
+              <a:latin typeface="Maven Pro"/>
+              <a:ea typeface="Maven Pro"/>
+              <a:cs typeface="Maven Pro"/>
+              <a:sym typeface="Maven Pro"/>
             </a:endParaRPr>
           </a:p>
         </p:txBody>
       </p:sp>
-      <p:sp>
-        <p:nvSpPr>
-          <p:cNvPr id="552" name="Google Shape;552;p49"/>
-          <p:cNvSpPr txBox="1"/>
+      <p:pic>
+        <p:nvPicPr>
+          <p:cNvPr id="556" name="Google Shape;556;p49"/>
+          <p:cNvPicPr preferRelativeResize="0"/>
           <p:nvPr/>
-        </p:nvSpPr>
-        <p:spPr>
-          <a:xfrm>
-            <a:off x="7617900" y="2773425"/>
-            <a:ext cx="1274400" cy="330900"/>
+        </p:nvPicPr>
+        <p:blipFill>
+          <a:blip r:embed="rId4">
+            <a:alphaModFix/>
+          </a:blip>
+          <a:stretch>
+            <a:fillRect/>
+          </a:stretch>
+        </p:blipFill>
+        <p:spPr>
+          <a:xfrm>
+            <a:off x="2493200" y="764525"/>
+            <a:ext cx="3815131" cy="393600"/>
           </a:xfrm>
           <a:prstGeom prst="rect">
             <a:avLst/>
@@ -25201,13 +25635,364 @@
             <a:noFill/>
           </a:ln>
         </p:spPr>
+      </p:pic>
+      <p:pic>
+        <p:nvPicPr>
+          <p:cNvPr id="557" name="Google Shape;557;p49"/>
+          <p:cNvPicPr preferRelativeResize="0"/>
+          <p:nvPr/>
+        </p:nvPicPr>
+        <p:blipFill>
+          <a:blip r:embed="rId5">
+            <a:alphaModFix/>
+          </a:blip>
+          <a:stretch>
+            <a:fillRect/>
+          </a:stretch>
+        </p:blipFill>
+        <p:spPr>
+          <a:xfrm>
+            <a:off x="3854700" y="1526425"/>
+            <a:ext cx="4086001" cy="1254975"/>
+          </a:xfrm>
+          <a:prstGeom prst="rect">
+            <a:avLst/>
+          </a:prstGeom>
+          <a:noFill/>
+          <a:ln>
+            <a:noFill/>
+          </a:ln>
+        </p:spPr>
+      </p:pic>
+      <p:pic>
+        <p:nvPicPr>
+          <p:cNvPr id="558" name="Google Shape;558;p49"/>
+          <p:cNvPicPr preferRelativeResize="0"/>
+          <p:nvPr/>
+        </p:nvPicPr>
+        <p:blipFill>
+          <a:blip r:embed="rId6">
+            <a:alphaModFix/>
+          </a:blip>
+          <a:stretch>
+            <a:fillRect/>
+          </a:stretch>
+        </p:blipFill>
+        <p:spPr>
+          <a:xfrm>
+            <a:off x="2695975" y="2856020"/>
+            <a:ext cx="2990724" cy="1529605"/>
+          </a:xfrm>
+          <a:prstGeom prst="rect">
+            <a:avLst/>
+          </a:prstGeom>
+          <a:noFill/>
+          <a:ln>
+            <a:noFill/>
+          </a:ln>
+        </p:spPr>
+      </p:pic>
+      <p:cxnSp>
+        <p:nvCxnSpPr>
+          <p:cNvPr id="559" name="Google Shape;559;p49"/>
+          <p:cNvCxnSpPr/>
+          <p:nvPr/>
+        </p:nvCxnSpPr>
+        <p:spPr>
+          <a:xfrm flipH="1" rot="10800000">
+            <a:off x="1790750" y="1364025"/>
+            <a:ext cx="1198500" cy="624300"/>
+          </a:xfrm>
+          <a:prstGeom prst="straightConnector1">
+            <a:avLst/>
+          </a:prstGeom>
+          <a:noFill/>
+          <a:ln cap="flat" cmpd="sng" w="28575">
+            <a:solidFill>
+              <a:srgbClr val="1A1A1A"/>
+            </a:solidFill>
+            <a:prstDash val="solid"/>
+            <a:round/>
+            <a:headEnd len="med" w="med" type="none"/>
+            <a:tailEnd len="med" w="med" type="triangle"/>
+          </a:ln>
+        </p:spPr>
+      </p:cxnSp>
+      <p:cxnSp>
+        <p:nvCxnSpPr>
+          <p:cNvPr id="560" name="Google Shape;560;p49"/>
+          <p:cNvCxnSpPr/>
+          <p:nvPr/>
+        </p:nvCxnSpPr>
+        <p:spPr>
+          <a:xfrm flipH="1" rot="10800000">
+            <a:off x="2005575" y="2225400"/>
+            <a:ext cx="1595400" cy="165000"/>
+          </a:xfrm>
+          <a:prstGeom prst="straightConnector1">
+            <a:avLst/>
+          </a:prstGeom>
+          <a:noFill/>
+          <a:ln cap="flat" cmpd="sng" w="28575">
+            <a:solidFill>
+              <a:srgbClr val="1A1A1A"/>
+            </a:solidFill>
+            <a:prstDash val="solid"/>
+            <a:round/>
+            <a:headEnd len="med" w="med" type="none"/>
+            <a:tailEnd len="med" w="med" type="triangle"/>
+          </a:ln>
+        </p:spPr>
+      </p:cxnSp>
+      <p:cxnSp>
+        <p:nvCxnSpPr>
+          <p:cNvPr id="561" name="Google Shape;561;p49"/>
+          <p:cNvCxnSpPr/>
+          <p:nvPr/>
+        </p:nvCxnSpPr>
+        <p:spPr>
+          <a:xfrm>
+            <a:off x="1703375" y="2768575"/>
+            <a:ext cx="967500" cy="599400"/>
+          </a:xfrm>
+          <a:prstGeom prst="straightConnector1">
+            <a:avLst/>
+          </a:prstGeom>
+          <a:noFill/>
+          <a:ln cap="flat" cmpd="sng" w="28575">
+            <a:solidFill>
+              <a:srgbClr val="1A1A1A"/>
+            </a:solidFill>
+            <a:prstDash val="solid"/>
+            <a:round/>
+            <a:headEnd len="med" w="med" type="none"/>
+            <a:tailEnd len="med" w="med" type="triangle"/>
+          </a:ln>
+        </p:spPr>
+      </p:cxnSp>
+      <p:sp>
+        <p:nvSpPr>
+          <p:cNvPr id="562" name="Google Shape;562;p49"/>
+          <p:cNvSpPr txBox="1"/>
+          <p:nvPr/>
+        </p:nvSpPr>
+        <p:spPr>
+          <a:xfrm>
+            <a:off x="6722025" y="3305400"/>
+            <a:ext cx="1595400" cy="836400"/>
+          </a:xfrm>
+          <a:prstGeom prst="rect">
+            <a:avLst/>
+          </a:prstGeom>
+          <a:noFill/>
+          <a:ln>
+            <a:noFill/>
+          </a:ln>
+        </p:spPr>
         <p:txBody>
-          <a:bodyPr anchorCtr="0" anchor="ctr" bIns="91425" lIns="91425" spcFirstLastPara="1" rIns="91425" wrap="square" tIns="91425">
+          <a:bodyPr anchorCtr="0" anchor="t" bIns="91425" lIns="91425" spcFirstLastPara="1" rIns="91425" wrap="square" tIns="91425">
             <a:noAutofit/>
           </a:bodyPr>
           <a:lstStyle/>
           <a:p>
-            <a:pPr indent="0" lvl="0" marL="0" rtl="0" algn="ctr">
+            <a:pPr indent="0" lvl="0" marL="0" rtl="0" algn="l">
+              <a:spcBef>
+                <a:spcPts val="0"/>
+              </a:spcBef>
+              <a:spcAft>
+                <a:spcPts val="0"/>
+              </a:spcAft>
+              <a:buNone/>
+            </a:pPr>
+            <a:r>
+              <a:rPr b="1" lang="fr" sz="1800">
+                <a:solidFill>
+                  <a:srgbClr val="FF0000"/>
+                </a:solidFill>
+              </a:rPr>
+              <a:t>etc.</a:t>
+            </a:r>
+            <a:endParaRPr b="1" sz="1800">
+              <a:solidFill>
+                <a:srgbClr val="FF0000"/>
+              </a:solidFill>
+            </a:endParaRPr>
+          </a:p>
+        </p:txBody>
+      </p:sp>
+    </p:spTree>
+  </p:cSld>
+  <p:clrMapOvr>
+    <a:masterClrMapping/>
+  </p:clrMapOvr>
+</p:sld>
+</file>
+
+<file path=ppt/slides/slide38.xml><?xml version="1.0" encoding="utf-8"?>
+<p:sld xmlns:a="http://schemas.openxmlformats.org/drawingml/2006/main" xmlns:r="http://schemas.openxmlformats.org/officeDocument/2006/relationships" xmlns:mc="http://schemas.openxmlformats.org/markup-compatibility/2006" xmlns:mv="urn:schemas-microsoft-com:mac:vml" xmlns:p="http://schemas.openxmlformats.org/presentationml/2006/main" xmlns:c="http://schemas.openxmlformats.org/drawingml/2006/chart" xmlns:dgm="http://schemas.openxmlformats.org/drawingml/2006/diagram" xmlns:o="urn:schemas-microsoft-com:office:office" xmlns:v="urn:schemas-microsoft-com:vml" xmlns:pvml="urn:schemas-microsoft-com:office:powerpoint" xmlns:com="http://schemas.openxmlformats.org/drawingml/2006/compatibility" xmlns:p14="http://schemas.microsoft.com/office/powerpoint/2010/main" xmlns:p15="http://schemas.microsoft.com/office/powerpoint/2012/main" xmlns:ahyp="http://schemas.microsoft.com/office/drawing/2018/hyperlinkcolor">
+  <p:cSld>
+    <p:bg>
+      <p:bgPr>
+        <a:blipFill>
+          <a:blip r:embed="rId3">
+            <a:alphaModFix/>
+          </a:blip>
+          <a:stretch>
+            <a:fillRect/>
+          </a:stretch>
+        </a:blipFill>
+      </p:bgPr>
+    </p:bg>
+    <p:spTree>
+      <p:nvGrpSpPr>
+        <p:cNvPr id="566" name="Shape 566"/>
+        <p:cNvGrpSpPr/>
+        <p:nvPr/>
+      </p:nvGrpSpPr>
+      <p:grpSpPr>
+        <a:xfrm>
+          <a:off x="0" y="0"/>
+          <a:ext cx="0" cy="0"/>
+          <a:chOff x="0" y="0"/>
+          <a:chExt cx="0" cy="0"/>
+        </a:xfrm>
+      </p:grpSpPr>
+      <p:sp>
+        <p:nvSpPr>
+          <p:cNvPr id="567" name="Google Shape;567;p50"/>
+          <p:cNvSpPr txBox="1"/>
+          <p:nvPr/>
+        </p:nvSpPr>
+        <p:spPr>
+          <a:xfrm>
+            <a:off x="3330375" y="0"/>
+            <a:ext cx="5451600" cy="330900"/>
+          </a:xfrm>
+          <a:prstGeom prst="rect">
+            <a:avLst/>
+          </a:prstGeom>
+          <a:noFill/>
+          <a:ln>
+            <a:noFill/>
+          </a:ln>
+        </p:spPr>
+        <p:txBody>
+          <a:bodyPr anchorCtr="0" anchor="t" bIns="91425" lIns="91425" spcFirstLastPara="1" rIns="91425" wrap="square" tIns="21600">
+            <a:noAutofit/>
+          </a:bodyPr>
+          <a:lstStyle/>
+          <a:p>
+            <a:pPr indent="0" lvl="0" marL="0" rtl="0" algn="l">
+              <a:spcBef>
+                <a:spcPts val="0"/>
+              </a:spcBef>
+              <a:spcAft>
+                <a:spcPts val="0"/>
+              </a:spcAft>
+              <a:buNone/>
+            </a:pPr>
+            <a:r>
+              <a:rPr b="1" lang="fr" sz="1800"/>
+              <a:t>Tool – Experiments: Incorrect Processes</a:t>
+            </a:r>
+            <a:endParaRPr b="1" sz="1800"/>
+          </a:p>
+        </p:txBody>
+      </p:sp>
+      <p:sp>
+        <p:nvSpPr>
+          <p:cNvPr id="568" name="Google Shape;568;p50"/>
+          <p:cNvSpPr txBox="1"/>
+          <p:nvPr>
+            <p:ph idx="12" type="sldNum"/>
+          </p:nvPr>
+        </p:nvSpPr>
+        <p:spPr>
+          <a:xfrm>
+            <a:off x="8472458" y="4663217"/>
+            <a:ext cx="548700" cy="393600"/>
+          </a:xfrm>
+          <a:prstGeom prst="rect">
+            <a:avLst/>
+          </a:prstGeom>
+        </p:spPr>
+        <p:txBody>
+          <a:bodyPr anchorCtr="0" anchor="ctr" bIns="91425" lIns="91425" spcFirstLastPara="1" rIns="91425" wrap="square" tIns="91425">
+            <a:normAutofit/>
+          </a:bodyPr>
+          <a:lstStyle/>
+          <a:p>
+            <a:pPr indent="0" lvl="0" marL="0" rtl="0" algn="r">
+              <a:spcBef>
+                <a:spcPts val="0"/>
+              </a:spcBef>
+              <a:spcAft>
+                <a:spcPts val="0"/>
+              </a:spcAft>
+              <a:buNone/>
+            </a:pPr>
+            <a:fld id="{00000000-1234-1234-1234-123412341234}" type="slidenum">
+              <a:rPr lang="fr"/>
+              <a:t>‹#›</a:t>
+            </a:fld>
+            <a:endParaRPr/>
+          </a:p>
+        </p:txBody>
+      </p:sp>
+      <p:pic>
+        <p:nvPicPr>
+          <p:cNvPr id="569" name="Google Shape;569;p50"/>
+          <p:cNvPicPr preferRelativeResize="0"/>
+          <p:nvPr/>
+        </p:nvPicPr>
+        <p:blipFill>
+          <a:blip r:embed="rId4">
+            <a:alphaModFix/>
+          </a:blip>
+          <a:stretch>
+            <a:fillRect/>
+          </a:stretch>
+        </p:blipFill>
+        <p:spPr>
+          <a:xfrm>
+            <a:off x="1663000" y="2139700"/>
+            <a:ext cx="5964150" cy="1438350"/>
+          </a:xfrm>
+          <a:prstGeom prst="rect">
+            <a:avLst/>
+          </a:prstGeom>
+          <a:noFill/>
+          <a:ln>
+            <a:noFill/>
+          </a:ln>
+        </p:spPr>
+      </p:pic>
+      <p:sp>
+        <p:nvSpPr>
+          <p:cNvPr id="570" name="Google Shape;570;p50"/>
+          <p:cNvSpPr txBox="1"/>
+          <p:nvPr/>
+        </p:nvSpPr>
+        <p:spPr>
+          <a:xfrm>
+            <a:off x="919825" y="760600"/>
+            <a:ext cx="7450500" cy="1157400"/>
+          </a:xfrm>
+          <a:prstGeom prst="rect">
+            <a:avLst/>
+          </a:prstGeom>
+          <a:noFill/>
+          <a:ln>
+            <a:noFill/>
+          </a:ln>
+        </p:spPr>
+        <p:txBody>
+          <a:bodyPr anchorCtr="0" anchor="t" bIns="91425" lIns="91425" spcFirstLastPara="1" rIns="91425" wrap="square" tIns="91425">
+            <a:noAutofit/>
+          </a:bodyPr>
+          <a:lstStyle/>
+          <a:p>
+            <a:pPr indent="0" lvl="0" marL="0" rtl="0" algn="l">
               <a:spcBef>
                 <a:spcPts val="0"/>
               </a:spcBef>
@@ -25219,40 +26004,274 @@
             <a:r>
               <a:rPr lang="fr" sz="1800">
                 <a:solidFill>
-                  <a:schemeClr val="accent1"/>
+                  <a:schemeClr val="dk1"/>
                 </a:solidFill>
               </a:rPr>
-              <a:t>[TSE’25]</a:t>
+              <a:t>The experiments conducted showed </a:t>
+            </a:r>
+            <a:r>
+              <a:rPr b="1" lang="fr" sz="1800">
+                <a:solidFill>
+                  <a:srgbClr val="FF0000"/>
+                </a:solidFill>
+              </a:rPr>
+              <a:t>14 incorrectly generated processes</a:t>
+            </a:r>
+            <a:r>
+              <a:rPr lang="fr" sz="1800">
+                <a:solidFill>
+                  <a:schemeClr val="dk1"/>
+                </a:solidFill>
+              </a:rPr>
+              <a:t>. To understand the </a:t>
+            </a:r>
+            <a:r>
+              <a:rPr b="1" lang="fr" sz="1800">
+                <a:solidFill>
+                  <a:srgbClr val="FF0000"/>
+                </a:solidFill>
+              </a:rPr>
+              <a:t>source of this incorrect generation</a:t>
+            </a:r>
+            <a:r>
+              <a:rPr lang="fr" sz="1800">
+                <a:solidFill>
+                  <a:schemeClr val="dk1"/>
+                </a:solidFill>
+              </a:rPr>
+              <a:t>, we </a:t>
+            </a:r>
+            <a:r>
+              <a:rPr b="1" lang="fr" sz="1800">
+                <a:solidFill>
+                  <a:srgbClr val="FF0000"/>
+                </a:solidFill>
+              </a:rPr>
+              <a:t>analysed the constraints</a:t>
+            </a:r>
+            <a:r>
+              <a:rPr lang="fr" sz="1800">
+                <a:solidFill>
+                  <a:schemeClr val="dk1"/>
+                </a:solidFill>
+              </a:rPr>
+              <a:t> returned by GPT in these 14 cases.</a:t>
             </a:r>
             <a:endParaRPr sz="1800">
               <a:solidFill>
-                <a:schemeClr val="accent1"/>
+                <a:schemeClr val="dk1"/>
               </a:solidFill>
             </a:endParaRPr>
           </a:p>
         </p:txBody>
       </p:sp>
-      <p:sp>
-        <p:nvSpPr>
-          <p:cNvPr id="553" name="Google Shape;553;p49"/>
+    </p:spTree>
+  </p:cSld>
+  <p:clrMapOvr>
+    <a:masterClrMapping/>
+  </p:clrMapOvr>
+</p:sld>
+</file>
+
+<file path=ppt/slides/slide39.xml><?xml version="1.0" encoding="utf-8"?>
+<p:sld xmlns:a="http://schemas.openxmlformats.org/drawingml/2006/main" xmlns:r="http://schemas.openxmlformats.org/officeDocument/2006/relationships" xmlns:mc="http://schemas.openxmlformats.org/markup-compatibility/2006" xmlns:mv="urn:schemas-microsoft-com:mac:vml" xmlns:p="http://schemas.openxmlformats.org/presentationml/2006/main" xmlns:c="http://schemas.openxmlformats.org/drawingml/2006/chart" xmlns:dgm="http://schemas.openxmlformats.org/drawingml/2006/diagram" xmlns:o="urn:schemas-microsoft-com:office:office" xmlns:v="urn:schemas-microsoft-com:vml" xmlns:pvml="urn:schemas-microsoft-com:office:powerpoint" xmlns:com="http://schemas.openxmlformats.org/drawingml/2006/compatibility" xmlns:p14="http://schemas.microsoft.com/office/powerpoint/2010/main" xmlns:p15="http://schemas.microsoft.com/office/powerpoint/2012/main" xmlns:ahyp="http://schemas.microsoft.com/office/drawing/2018/hyperlinkcolor">
+  <p:cSld>
+    <p:bg>
+      <p:bgPr>
+        <a:blipFill>
+          <a:blip r:embed="rId3">
+            <a:alphaModFix/>
+          </a:blip>
+          <a:stretch>
+            <a:fillRect/>
+          </a:stretch>
+        </a:blipFill>
+      </p:bgPr>
+    </p:bg>
+    <p:spTree>
+      <p:nvGrpSpPr>
+        <p:cNvPr id="574" name="Shape 574"/>
+        <p:cNvGrpSpPr/>
+        <p:nvPr/>
+      </p:nvGrpSpPr>
+      <p:grpSpPr>
+        <a:xfrm>
+          <a:off x="0" y="0"/>
+          <a:ext cx="0" cy="0"/>
+          <a:chOff x="0" y="0"/>
+          <a:chExt cx="0" cy="0"/>
+        </a:xfrm>
+      </p:grpSpPr>
+      <p:sp>
+        <p:nvSpPr>
+          <p:cNvPr id="575" name="Google Shape;575;p51"/>
+          <p:cNvSpPr txBox="1"/>
+          <p:nvPr/>
+        </p:nvSpPr>
+        <p:spPr>
+          <a:xfrm>
+            <a:off x="3330375" y="0"/>
+            <a:ext cx="5451600" cy="330900"/>
+          </a:xfrm>
+          <a:prstGeom prst="rect">
+            <a:avLst/>
+          </a:prstGeom>
+          <a:noFill/>
+          <a:ln>
+            <a:noFill/>
+          </a:ln>
+        </p:spPr>
+        <p:txBody>
+          <a:bodyPr anchorCtr="0" anchor="t" bIns="91425" lIns="91425" spcFirstLastPara="1" rIns="91425" wrap="square" tIns="21600">
+            <a:noAutofit/>
+          </a:bodyPr>
+          <a:lstStyle/>
+          <a:p>
+            <a:pPr indent="0" lvl="0" marL="0" rtl="0" algn="l">
+              <a:spcBef>
+                <a:spcPts val="0"/>
+              </a:spcBef>
+              <a:spcAft>
+                <a:spcPts val="0"/>
+              </a:spcAft>
+              <a:buNone/>
+            </a:pPr>
+            <a:r>
+              <a:rPr b="1" lang="fr" sz="1800"/>
+              <a:t>Tool – Experiments: Unnamed Tasks</a:t>
+            </a:r>
+            <a:endParaRPr b="1" sz="1800"/>
+          </a:p>
+        </p:txBody>
+      </p:sp>
+      <p:sp>
+        <p:nvSpPr>
+          <p:cNvPr id="576" name="Google Shape;576;p51"/>
+          <p:cNvSpPr txBox="1"/>
+          <p:nvPr>
+            <p:ph idx="12" type="sldNum"/>
+          </p:nvPr>
+        </p:nvSpPr>
+        <p:spPr>
+          <a:xfrm>
+            <a:off x="8472458" y="4663217"/>
+            <a:ext cx="548700" cy="393600"/>
+          </a:xfrm>
+          <a:prstGeom prst="rect">
+            <a:avLst/>
+          </a:prstGeom>
+        </p:spPr>
+        <p:txBody>
+          <a:bodyPr anchorCtr="0" anchor="ctr" bIns="91425" lIns="91425" spcFirstLastPara="1" rIns="91425" wrap="square" tIns="91425">
+            <a:normAutofit/>
+          </a:bodyPr>
+          <a:lstStyle/>
+          <a:p>
+            <a:pPr indent="0" lvl="0" marL="0" rtl="0" algn="r">
+              <a:spcBef>
+                <a:spcPts val="0"/>
+              </a:spcBef>
+              <a:spcAft>
+                <a:spcPts val="0"/>
+              </a:spcAft>
+              <a:buNone/>
+            </a:pPr>
+            <a:fld id="{00000000-1234-1234-1234-123412341234}" type="slidenum">
+              <a:rPr lang="fr"/>
+              <a:t>‹#›</a:t>
+            </a:fld>
+            <a:endParaRPr/>
+          </a:p>
+        </p:txBody>
+      </p:sp>
+      <p:sp>
+        <p:nvSpPr>
+          <p:cNvPr id="577" name="Google Shape;577;p51"/>
+          <p:cNvSpPr txBox="1"/>
+          <p:nvPr/>
+        </p:nvSpPr>
+        <p:spPr>
+          <a:xfrm>
+            <a:off x="907325" y="468900"/>
+            <a:ext cx="7450500" cy="1157400"/>
+          </a:xfrm>
+          <a:prstGeom prst="rect">
+            <a:avLst/>
+          </a:prstGeom>
+          <a:noFill/>
+          <a:ln>
+            <a:noFill/>
+          </a:ln>
+        </p:spPr>
+        <p:txBody>
+          <a:bodyPr anchorCtr="0" anchor="t" bIns="91425" lIns="91425" spcFirstLastPara="1" rIns="91425" wrap="square" tIns="91425">
+            <a:noAutofit/>
+          </a:bodyPr>
+          <a:lstStyle/>
+          <a:p>
+            <a:pPr indent="0" lvl="0" marL="0" rtl="0" algn="l">
+              <a:spcBef>
+                <a:spcPts val="0"/>
+              </a:spcBef>
+              <a:spcAft>
+                <a:spcPts val="0"/>
+              </a:spcAft>
+              <a:buNone/>
+            </a:pPr>
+            <a:r>
+              <a:rPr lang="fr" sz="1800">
+                <a:solidFill>
+                  <a:schemeClr val="dk1"/>
+                </a:solidFill>
+              </a:rPr>
+              <a:t>The last phase of these experiments consisted in </a:t>
+            </a:r>
+            <a:r>
+              <a:rPr b="1" lang="fr" sz="1800">
+                <a:solidFill>
+                  <a:srgbClr val="FF0000"/>
+                </a:solidFill>
+              </a:rPr>
+              <a:t>analysing the quality of the tool when the description is raw</a:t>
+            </a:r>
+            <a:r>
+              <a:rPr lang="fr" sz="1800">
+                <a:solidFill>
+                  <a:schemeClr val="dk1"/>
+                </a:solidFill>
+              </a:rPr>
+              <a:t> (i.e., the tasks of the description are not named beforehand).</a:t>
+            </a:r>
+            <a:endParaRPr sz="1800">
+              <a:solidFill>
+                <a:schemeClr val="dk1"/>
+              </a:solidFill>
+            </a:endParaRPr>
+          </a:p>
+        </p:txBody>
+      </p:sp>
+      <p:sp>
+        <p:nvSpPr>
+          <p:cNvPr id="578" name="Google Shape;578;p51"/>
           <p:cNvSpPr/>
           <p:nvPr/>
         </p:nvSpPr>
         <p:spPr>
           <a:xfrm>
-            <a:off x="7798675" y="3376400"/>
-            <a:ext cx="171900" cy="453900"/>
-          </a:xfrm>
-          <a:prstGeom prst="rightBrace">
+            <a:off x="441550" y="1626300"/>
+            <a:ext cx="3733800" cy="2525700"/>
+          </a:xfrm>
+          <a:prstGeom prst="roundRect">
             <a:avLst>
-              <a:gd fmla="val 50000" name="adj1"/>
-              <a:gd fmla="val 50000" name="adj2"/>
+              <a:gd fmla="val 16667" name="adj"/>
             </a:avLst>
           </a:prstGeom>
-          <a:noFill/>
-          <a:ln cap="flat" cmpd="sng" w="19050">
+          <a:solidFill>
+            <a:srgbClr val="FFF2CC"/>
+          </a:solidFill>
+          <a:ln cap="flat" cmpd="sng" w="28575">
             <a:solidFill>
-              <a:srgbClr val="6AA84F"/>
+              <a:srgbClr val="BF9000"/>
             </a:solidFill>
             <a:prstDash val="solid"/>
             <a:round/>
@@ -25266,105 +26285,140 @@
           </a:bodyPr>
           <a:lstStyle/>
           <a:p>
-            <a:pPr indent="0" lvl="0" marL="0" rtl="0" algn="ctr">
-              <a:spcBef>
-                <a:spcPts val="0"/>
-              </a:spcBef>
-              <a:spcAft>
-                <a:spcPts val="0"/>
-              </a:spcAft>
-              <a:buNone/>
-            </a:pPr>
-            <a:r>
-              <a:t/>
-            </a:r>
-            <a:endParaRPr>
-              <a:solidFill>
-                <a:srgbClr val="6AA84F"/>
-              </a:solidFill>
+            <a:pPr indent="0" lvl="0" marL="0" rtl="0" algn="l">
+              <a:spcBef>
+                <a:spcPts val="0"/>
+              </a:spcBef>
+              <a:spcAft>
+                <a:spcPts val="0"/>
+              </a:spcAft>
+              <a:buClr>
+                <a:schemeClr val="dk1"/>
+              </a:buClr>
+              <a:buSzPts val="1100"/>
+              <a:buFont typeface="Arial"/>
+              <a:buNone/>
+            </a:pPr>
+            <a:r>
+              <a:rPr lang="fr" sz="1700">
+                <a:latin typeface="Maven Pro"/>
+                <a:ea typeface="Maven Pro"/>
+                <a:cs typeface="Maven Pro"/>
+                <a:sym typeface="Maven Pro"/>
+              </a:rPr>
+              <a:t>First, the banker either </a:t>
+            </a:r>
+            <a:r>
+              <a:rPr lang="fr" sz="1700" u="sng">
+                <a:latin typeface="Maven Pro"/>
+                <a:ea typeface="Maven Pro"/>
+                <a:cs typeface="Maven Pro"/>
+                <a:sym typeface="Maven Pro"/>
+              </a:rPr>
+              <a:t>CreateProfile</a:t>
+            </a:r>
+            <a:r>
+              <a:rPr lang="fr" sz="1700">
+                <a:latin typeface="Maven Pro"/>
+                <a:ea typeface="Maven Pro"/>
+                <a:cs typeface="Maven Pro"/>
+                <a:sym typeface="Maven Pro"/>
+              </a:rPr>
+              <a:t> (CP) for the user, or, if it is not</a:t>
+            </a:r>
+            <a:endParaRPr sz="1700">
+              <a:latin typeface="Maven Pro"/>
+              <a:ea typeface="Maven Pro"/>
+              <a:cs typeface="Maven Pro"/>
+              <a:sym typeface="Maven Pro"/>
             </a:endParaRPr>
           </a:p>
+          <a:p>
+            <a:pPr indent="0" lvl="0" marL="0" rtl="0" algn="l">
+              <a:spcBef>
+                <a:spcPts val="0"/>
+              </a:spcBef>
+              <a:spcAft>
+                <a:spcPts val="0"/>
+              </a:spcAft>
+              <a:buNone/>
+            </a:pPr>
+            <a:r>
+              <a:rPr lang="fr" sz="1700">
+                <a:latin typeface="Maven Pro"/>
+                <a:ea typeface="Maven Pro"/>
+                <a:cs typeface="Maven Pro"/>
+                <a:sym typeface="Maven Pro"/>
+              </a:rPr>
+              <a:t>needed, he </a:t>
+            </a:r>
+            <a:r>
+              <a:rPr lang="fr" sz="1700" u="sng">
+                <a:latin typeface="Maven Pro"/>
+                <a:ea typeface="Maven Pro"/>
+                <a:cs typeface="Maven Pro"/>
+                <a:sym typeface="Maven Pro"/>
+              </a:rPr>
+              <a:t>RetrieveCustomerProfile</a:t>
+            </a:r>
+            <a:r>
+              <a:rPr lang="fr" sz="1700">
+                <a:latin typeface="Maven Pro"/>
+                <a:ea typeface="Maven Pro"/>
+                <a:cs typeface="Maven Pro"/>
+                <a:sym typeface="Maven Pro"/>
+              </a:rPr>
+              <a:t> (RCP) which triggers the system to perform the </a:t>
+            </a:r>
+            <a:r>
+              <a:rPr lang="fr" sz="1700" u="sng">
+                <a:latin typeface="Maven Pro"/>
+                <a:ea typeface="Maven Pro"/>
+                <a:cs typeface="Maven Pro"/>
+                <a:sym typeface="Maven Pro"/>
+              </a:rPr>
+              <a:t>AnalyseCustomerProfile</a:t>
+            </a:r>
+            <a:r>
+              <a:rPr lang="fr" sz="1700">
+                <a:latin typeface="Maven Pro"/>
+                <a:ea typeface="Maven Pro"/>
+                <a:cs typeface="Maven Pro"/>
+                <a:sym typeface="Maven Pro"/>
+              </a:rPr>
+              <a:t> (ACP) task.</a:t>
+            </a:r>
+            <a:endParaRPr sz="1700">
+              <a:latin typeface="Maven Pro"/>
+              <a:ea typeface="Maven Pro"/>
+              <a:cs typeface="Maven Pro"/>
+              <a:sym typeface="Maven Pro"/>
+            </a:endParaRPr>
+          </a:p>
         </p:txBody>
       </p:sp>
       <p:sp>
         <p:nvSpPr>
-          <p:cNvPr id="554" name="Google Shape;554;p49"/>
-          <p:cNvSpPr txBox="1"/>
-          <p:nvPr/>
-        </p:nvSpPr>
-        <p:spPr>
-          <a:xfrm>
-            <a:off x="7918200" y="3437900"/>
-            <a:ext cx="1225800" cy="330900"/>
-          </a:xfrm>
-          <a:prstGeom prst="rect">
-            <a:avLst/>
-          </a:prstGeom>
-          <a:noFill/>
-          <a:ln>
-            <a:noFill/>
-          </a:ln>
-        </p:spPr>
-        <p:txBody>
-          <a:bodyPr anchorCtr="0" anchor="ctr" bIns="91425" lIns="91425" spcFirstLastPara="1" rIns="91425" wrap="square" tIns="91425">
-            <a:noAutofit/>
-          </a:bodyPr>
-          <a:lstStyle/>
-          <a:p>
-            <a:pPr indent="0" lvl="0" marL="0" rtl="0" algn="ctr">
-              <a:spcBef>
-                <a:spcPts val="0"/>
-              </a:spcBef>
-              <a:spcAft>
-                <a:spcPts val="0"/>
-              </a:spcAft>
-              <a:buNone/>
-            </a:pPr>
-            <a:r>
-              <a:rPr lang="fr" sz="1800">
-                <a:solidFill>
-                  <a:srgbClr val="6AA84F"/>
-                </a:solidFill>
-              </a:rPr>
-              <a:t>[F</a:t>
-            </a:r>
-            <a:r>
-              <a:rPr lang="fr" sz="1800">
-                <a:solidFill>
-                  <a:srgbClr val="6AA84F"/>
-                </a:solidFill>
-              </a:rPr>
-              <a:t>SE’25]</a:t>
-            </a:r>
-            <a:endParaRPr sz="1800">
-              <a:solidFill>
-                <a:srgbClr val="6AA84F"/>
-              </a:solidFill>
-            </a:endParaRPr>
-          </a:p>
-        </p:txBody>
-      </p:sp>
-      <p:sp>
-        <p:nvSpPr>
-          <p:cNvPr id="555" name="Google Shape;555;p49"/>
+          <p:cNvPr id="579" name="Google Shape;579;p51"/>
           <p:cNvSpPr/>
           <p:nvPr/>
         </p:nvSpPr>
         <p:spPr>
           <a:xfrm>
-            <a:off x="6262475" y="3718400"/>
-            <a:ext cx="171900" cy="453900"/>
-          </a:xfrm>
-          <a:prstGeom prst="rightBrace">
+            <a:off x="5227650" y="1860300"/>
+            <a:ext cx="3500700" cy="2057700"/>
+          </a:xfrm>
+          <a:prstGeom prst="roundRect">
             <a:avLst>
-              <a:gd fmla="val 50000" name="adj1"/>
-              <a:gd fmla="val 50000" name="adj2"/>
+              <a:gd fmla="val 16667" name="adj"/>
             </a:avLst>
           </a:prstGeom>
-          <a:noFill/>
-          <a:ln cap="flat" cmpd="sng" w="19050">
+          <a:solidFill>
+            <a:srgbClr val="FFF2CC"/>
+          </a:solidFill>
+          <a:ln cap="flat" cmpd="sng" w="28575">
             <a:solidFill>
-              <a:srgbClr val="4A86E8"/>
+              <a:srgbClr val="BF9000"/>
             </a:solidFill>
             <a:prstDash val="solid"/>
             <a:round/>
@@ -25378,76 +26432,64 @@
           </a:bodyPr>
           <a:lstStyle/>
           <a:p>
-            <a:pPr indent="0" lvl="0" marL="0" rtl="0" algn="ctr">
-              <a:spcBef>
-                <a:spcPts val="0"/>
-              </a:spcBef>
-              <a:spcAft>
-                <a:spcPts val="0"/>
-              </a:spcAft>
-              <a:buNone/>
-            </a:pPr>
-            <a:r>
-              <a:t/>
-            </a:r>
-            <a:endParaRPr>
-              <a:solidFill>
-                <a:srgbClr val="0000FF"/>
-              </a:solidFill>
+            <a:pPr indent="0" lvl="0" marL="0" rtl="0" algn="l">
+              <a:spcBef>
+                <a:spcPts val="0"/>
+              </a:spcBef>
+              <a:spcAft>
+                <a:spcPts val="0"/>
+              </a:spcAft>
+              <a:buClr>
+                <a:schemeClr val="dk1"/>
+              </a:buClr>
+              <a:buSzPts val="1100"/>
+              <a:buFont typeface="Arial"/>
+              <a:buNone/>
+            </a:pPr>
+            <a:r>
+              <a:rPr lang="fr" sz="1700">
+                <a:latin typeface="Maven Pro"/>
+                <a:ea typeface="Maven Pro"/>
+                <a:cs typeface="Maven Pro"/>
+                <a:sym typeface="Maven Pro"/>
+              </a:rPr>
+              <a:t>First, the banker either creates a profile for the user, or, if it is not needed, he retrieves the customer profile which triggers the system to analyse it.</a:t>
+            </a:r>
+            <a:endParaRPr sz="1700">
+              <a:latin typeface="Maven Pro"/>
+              <a:ea typeface="Maven Pro"/>
+              <a:cs typeface="Maven Pro"/>
+              <a:sym typeface="Maven Pro"/>
             </a:endParaRPr>
           </a:p>
         </p:txBody>
       </p:sp>
-      <p:sp>
-        <p:nvSpPr>
-          <p:cNvPr id="556" name="Google Shape;556;p49"/>
-          <p:cNvSpPr txBox="1"/>
+      <p:cxnSp>
+        <p:nvCxnSpPr>
+          <p:cNvPr id="580" name="Google Shape;580;p51"/>
+          <p:cNvCxnSpPr/>
           <p:nvPr/>
-        </p:nvSpPr>
-        <p:spPr>
-          <a:xfrm>
-            <a:off x="6382600" y="3779900"/>
-            <a:ext cx="1684800" cy="330900"/>
-          </a:xfrm>
-          <a:prstGeom prst="rect">
+        </p:nvCxnSpPr>
+        <p:spPr>
+          <a:xfrm flipH="1" rot="10800000">
+            <a:off x="4214600" y="2886000"/>
+            <a:ext cx="973800" cy="6300"/>
+          </a:xfrm>
+          <a:prstGeom prst="straightConnector1">
             <a:avLst/>
           </a:prstGeom>
           <a:noFill/>
-          <a:ln>
-            <a:noFill/>
+          <a:ln cap="flat" cmpd="sng" w="38100">
+            <a:solidFill>
+              <a:srgbClr val="FF0000"/>
+            </a:solidFill>
+            <a:prstDash val="solid"/>
+            <a:round/>
+            <a:headEnd len="med" w="med" type="none"/>
+            <a:tailEnd len="med" w="med" type="triangle"/>
           </a:ln>
         </p:spPr>
-        <p:txBody>
-          <a:bodyPr anchorCtr="0" anchor="ctr" bIns="91425" lIns="91425" spcFirstLastPara="1" rIns="91425" wrap="square" tIns="91425">
-            <a:noAutofit/>
-          </a:bodyPr>
-          <a:lstStyle/>
-          <a:p>
-            <a:pPr indent="0" lvl="0" marL="0" rtl="0" algn="ctr">
-              <a:spcBef>
-                <a:spcPts val="0"/>
-              </a:spcBef>
-              <a:spcAft>
-                <a:spcPts val="0"/>
-              </a:spcAft>
-              <a:buNone/>
-            </a:pPr>
-            <a:r>
-              <a:rPr lang="fr" sz="1800">
-                <a:solidFill>
-                  <a:schemeClr val="accent1"/>
-                </a:solidFill>
-              </a:rPr>
-              <a:t>David’s work</a:t>
-            </a:r>
-            <a:endParaRPr sz="1800">
-              <a:solidFill>
-                <a:schemeClr val="accent1"/>
-              </a:solidFill>
-            </a:endParaRPr>
-          </a:p>
-        </p:txBody>
-      </p:sp>
+      </p:cxnSp>
     </p:spTree>
   </p:cSld>
   <p:clrMapOvr>
@@ -26851,6 +27893,1472 @@
 </p:sld>
 </file>
 
+<file path=ppt/slides/slide40.xml><?xml version="1.0" encoding="utf-8"?>
+<p:sld xmlns:a="http://schemas.openxmlformats.org/drawingml/2006/main" xmlns:r="http://schemas.openxmlformats.org/officeDocument/2006/relationships" xmlns:mc="http://schemas.openxmlformats.org/markup-compatibility/2006" xmlns:mv="urn:schemas-microsoft-com:mac:vml" xmlns:p="http://schemas.openxmlformats.org/presentationml/2006/main" xmlns:c="http://schemas.openxmlformats.org/drawingml/2006/chart" xmlns:dgm="http://schemas.openxmlformats.org/drawingml/2006/diagram" xmlns:o="urn:schemas-microsoft-com:office:office" xmlns:v="urn:schemas-microsoft-com:vml" xmlns:pvml="urn:schemas-microsoft-com:office:powerpoint" xmlns:com="http://schemas.openxmlformats.org/drawingml/2006/compatibility" xmlns:p14="http://schemas.microsoft.com/office/powerpoint/2010/main" xmlns:p15="http://schemas.microsoft.com/office/powerpoint/2012/main" xmlns:ahyp="http://schemas.microsoft.com/office/drawing/2018/hyperlinkcolor">
+  <p:cSld>
+    <p:bg>
+      <p:bgPr>
+        <a:blipFill>
+          <a:blip r:embed="rId3">
+            <a:alphaModFix/>
+          </a:blip>
+          <a:stretch>
+            <a:fillRect/>
+          </a:stretch>
+        </a:blipFill>
+      </p:bgPr>
+    </p:bg>
+    <p:spTree>
+      <p:nvGrpSpPr>
+        <p:cNvPr id="584" name="Shape 584"/>
+        <p:cNvGrpSpPr/>
+        <p:nvPr/>
+      </p:nvGrpSpPr>
+      <p:grpSpPr>
+        <a:xfrm>
+          <a:off x="0" y="0"/>
+          <a:ext cx="0" cy="0"/>
+          <a:chOff x="0" y="0"/>
+          <a:chExt cx="0" cy="0"/>
+        </a:xfrm>
+      </p:grpSpPr>
+      <p:sp>
+        <p:nvSpPr>
+          <p:cNvPr id="585" name="Google Shape;585;p52"/>
+          <p:cNvSpPr txBox="1"/>
+          <p:nvPr/>
+        </p:nvSpPr>
+        <p:spPr>
+          <a:xfrm>
+            <a:off x="3330375" y="0"/>
+            <a:ext cx="5451600" cy="330900"/>
+          </a:xfrm>
+          <a:prstGeom prst="rect">
+            <a:avLst/>
+          </a:prstGeom>
+          <a:noFill/>
+          <a:ln>
+            <a:noFill/>
+          </a:ln>
+        </p:spPr>
+        <p:txBody>
+          <a:bodyPr anchorCtr="0" anchor="t" bIns="91425" lIns="91425" spcFirstLastPara="1" rIns="91425" wrap="square" tIns="21600">
+            <a:noAutofit/>
+          </a:bodyPr>
+          <a:lstStyle/>
+          <a:p>
+            <a:pPr indent="0" lvl="0" marL="0" rtl="0" algn="l">
+              <a:spcBef>
+                <a:spcPts val="0"/>
+              </a:spcBef>
+              <a:spcAft>
+                <a:spcPts val="0"/>
+              </a:spcAft>
+              <a:buNone/>
+            </a:pPr>
+            <a:r>
+              <a:rPr b="1" lang="fr" sz="1800"/>
+              <a:t>Tool – Experiments: Unnamed Tasks</a:t>
+            </a:r>
+            <a:endParaRPr b="1" sz="1800"/>
+          </a:p>
+        </p:txBody>
+      </p:sp>
+      <p:sp>
+        <p:nvSpPr>
+          <p:cNvPr id="586" name="Google Shape;586;p52"/>
+          <p:cNvSpPr txBox="1"/>
+          <p:nvPr>
+            <p:ph idx="12" type="sldNum"/>
+          </p:nvPr>
+        </p:nvSpPr>
+        <p:spPr>
+          <a:xfrm>
+            <a:off x="8472458" y="4663217"/>
+            <a:ext cx="548700" cy="393600"/>
+          </a:xfrm>
+          <a:prstGeom prst="rect">
+            <a:avLst/>
+          </a:prstGeom>
+        </p:spPr>
+        <p:txBody>
+          <a:bodyPr anchorCtr="0" anchor="ctr" bIns="91425" lIns="91425" spcFirstLastPara="1" rIns="91425" wrap="square" tIns="91425">
+            <a:normAutofit/>
+          </a:bodyPr>
+          <a:lstStyle/>
+          <a:p>
+            <a:pPr indent="0" lvl="0" marL="0" rtl="0" algn="r">
+              <a:spcBef>
+                <a:spcPts val="0"/>
+              </a:spcBef>
+              <a:spcAft>
+                <a:spcPts val="0"/>
+              </a:spcAft>
+              <a:buNone/>
+            </a:pPr>
+            <a:fld id="{00000000-1234-1234-1234-123412341234}" type="slidenum">
+              <a:rPr lang="fr"/>
+              <a:t>‹#›</a:t>
+            </a:fld>
+            <a:endParaRPr/>
+          </a:p>
+        </p:txBody>
+      </p:sp>
+      <p:sp>
+        <p:nvSpPr>
+          <p:cNvPr id="587" name="Google Shape;587;p52"/>
+          <p:cNvSpPr txBox="1"/>
+          <p:nvPr/>
+        </p:nvSpPr>
+        <p:spPr>
+          <a:xfrm>
+            <a:off x="913575" y="924575"/>
+            <a:ext cx="7450500" cy="3192300"/>
+          </a:xfrm>
+          <a:prstGeom prst="rect">
+            <a:avLst/>
+          </a:prstGeom>
+          <a:noFill/>
+          <a:ln>
+            <a:noFill/>
+          </a:ln>
+        </p:spPr>
+        <p:txBody>
+          <a:bodyPr anchorCtr="0" anchor="t" bIns="91425" lIns="91425" spcFirstLastPara="1" rIns="91425" wrap="square" tIns="91425">
+            <a:noAutofit/>
+          </a:bodyPr>
+          <a:lstStyle/>
+          <a:p>
+            <a:pPr indent="0" lvl="0" marL="0" rtl="0" algn="l">
+              <a:spcBef>
+                <a:spcPts val="0"/>
+              </a:spcBef>
+              <a:spcAft>
+                <a:spcPts val="0"/>
+              </a:spcAft>
+              <a:buNone/>
+            </a:pPr>
+            <a:r>
+              <a:rPr lang="fr" sz="1800">
+                <a:solidFill>
+                  <a:schemeClr val="dk1"/>
+                </a:solidFill>
+              </a:rPr>
+              <a:t>These experiments showed </a:t>
+            </a:r>
+            <a:r>
+              <a:rPr b="1" lang="fr" sz="1800">
+                <a:solidFill>
+                  <a:srgbClr val="FF0000"/>
+                </a:solidFill>
+              </a:rPr>
+              <a:t>a degradation of 16%</a:t>
+            </a:r>
+            <a:r>
+              <a:rPr lang="fr" sz="1800">
+                <a:solidFill>
+                  <a:schemeClr val="dk1"/>
+                </a:solidFill>
+              </a:rPr>
+              <a:t> of the quality of the results when tasks are unnamed, for </a:t>
+            </a:r>
+            <a:r>
+              <a:rPr b="1" lang="fr" sz="1800">
+                <a:solidFill>
+                  <a:srgbClr val="FF0000"/>
+                </a:solidFill>
+              </a:rPr>
+              <a:t>three different reasons</a:t>
+            </a:r>
+            <a:r>
+              <a:rPr lang="fr" sz="1800">
+                <a:solidFill>
+                  <a:schemeClr val="dk1"/>
+                </a:solidFill>
+              </a:rPr>
+              <a:t>:</a:t>
+            </a:r>
+            <a:br>
+              <a:rPr lang="fr" sz="1800">
+                <a:solidFill>
+                  <a:schemeClr val="dk1"/>
+                </a:solidFill>
+              </a:rPr>
+            </a:br>
+            <a:endParaRPr sz="1800">
+              <a:solidFill>
+                <a:schemeClr val="dk1"/>
+              </a:solidFill>
+            </a:endParaRPr>
+          </a:p>
+          <a:p>
+            <a:pPr indent="-342900" lvl="0" marL="457200" rtl="0" algn="l">
+              <a:spcBef>
+                <a:spcPts val="0"/>
+              </a:spcBef>
+              <a:spcAft>
+                <a:spcPts val="0"/>
+              </a:spcAft>
+              <a:buClr>
+                <a:schemeClr val="dk1"/>
+              </a:buClr>
+              <a:buSzPts val="1800"/>
+              <a:buChar char="●"/>
+            </a:pPr>
+            <a:r>
+              <a:rPr lang="fr" sz="1800">
+                <a:solidFill>
+                  <a:schemeClr val="dk1"/>
+                </a:solidFill>
+              </a:rPr>
+              <a:t>GPT may </a:t>
+            </a:r>
+            <a:r>
+              <a:rPr b="1" lang="fr" sz="1800">
+                <a:solidFill>
+                  <a:srgbClr val="FF0000"/>
+                </a:solidFill>
+              </a:rPr>
+              <a:t>introduce</a:t>
+            </a:r>
+            <a:r>
+              <a:rPr b="1" lang="fr" sz="1800">
+                <a:solidFill>
+                  <a:srgbClr val="FF0000"/>
+                </a:solidFill>
+              </a:rPr>
+              <a:t> unnecessary tasks</a:t>
+            </a:r>
+            <a:br>
+              <a:rPr lang="fr" sz="1800">
+                <a:solidFill>
+                  <a:schemeClr val="dk1"/>
+                </a:solidFill>
+              </a:rPr>
+            </a:br>
+            <a:endParaRPr sz="1800">
+              <a:solidFill>
+                <a:schemeClr val="dk1"/>
+              </a:solidFill>
+            </a:endParaRPr>
+          </a:p>
+          <a:p>
+            <a:pPr indent="-342900" lvl="0" marL="457200" rtl="0" algn="l">
+              <a:spcBef>
+                <a:spcPts val="0"/>
+              </a:spcBef>
+              <a:spcAft>
+                <a:spcPts val="0"/>
+              </a:spcAft>
+              <a:buClr>
+                <a:schemeClr val="dk1"/>
+              </a:buClr>
+              <a:buSzPts val="1800"/>
+              <a:buChar char="●"/>
+            </a:pPr>
+            <a:r>
+              <a:rPr lang="fr" sz="1800">
+                <a:solidFill>
+                  <a:schemeClr val="dk1"/>
+                </a:solidFill>
+              </a:rPr>
+              <a:t>GPT may </a:t>
+            </a:r>
+            <a:r>
+              <a:rPr b="1" lang="fr" sz="1800">
+                <a:solidFill>
+                  <a:srgbClr val="FF0000"/>
+                </a:solidFill>
+              </a:rPr>
+              <a:t>remove desired tasks</a:t>
+            </a:r>
+            <a:br>
+              <a:rPr b="1" lang="fr" sz="1800">
+                <a:solidFill>
+                  <a:srgbClr val="FF0000"/>
+                </a:solidFill>
+              </a:rPr>
+            </a:br>
+            <a:endParaRPr b="1" sz="1800">
+              <a:solidFill>
+                <a:srgbClr val="FF0000"/>
+              </a:solidFill>
+            </a:endParaRPr>
+          </a:p>
+          <a:p>
+            <a:pPr indent="-342900" lvl="0" marL="457200" rtl="0" algn="l">
+              <a:spcBef>
+                <a:spcPts val="0"/>
+              </a:spcBef>
+              <a:spcAft>
+                <a:spcPts val="0"/>
+              </a:spcAft>
+              <a:buClr>
+                <a:schemeClr val="dk1"/>
+              </a:buClr>
+              <a:buSzPts val="1800"/>
+              <a:buChar char="●"/>
+            </a:pPr>
+            <a:r>
+              <a:rPr lang="fr" sz="1800">
+                <a:solidFill>
+                  <a:schemeClr val="dk1"/>
+                </a:solidFill>
+              </a:rPr>
+              <a:t>GPT may </a:t>
+            </a:r>
+            <a:r>
+              <a:rPr b="1" lang="fr" sz="1800">
+                <a:solidFill>
+                  <a:srgbClr val="FF0000"/>
+                </a:solidFill>
+              </a:rPr>
+              <a:t>not recognise that two distinct portions of text correspond to the same task</a:t>
+            </a:r>
+            <a:r>
+              <a:rPr lang="fr" sz="1800">
+                <a:solidFill>
+                  <a:schemeClr val="dk1"/>
+                </a:solidFill>
+              </a:rPr>
+              <a:t>, thus creating two different tasks</a:t>
+            </a:r>
+            <a:endParaRPr sz="1800">
+              <a:solidFill>
+                <a:schemeClr val="dk1"/>
+              </a:solidFill>
+            </a:endParaRPr>
+          </a:p>
+        </p:txBody>
+      </p:sp>
+    </p:spTree>
+  </p:cSld>
+  <p:clrMapOvr>
+    <a:masterClrMapping/>
+  </p:clrMapOvr>
+</p:sld>
+</file>
+
+<file path=ppt/slides/slide41.xml><?xml version="1.0" encoding="utf-8"?>
+<p:sld xmlns:a="http://schemas.openxmlformats.org/drawingml/2006/main" xmlns:r="http://schemas.openxmlformats.org/officeDocument/2006/relationships" xmlns:mc="http://schemas.openxmlformats.org/markup-compatibility/2006" xmlns:mv="urn:schemas-microsoft-com:mac:vml" xmlns:p="http://schemas.openxmlformats.org/presentationml/2006/main" xmlns:c="http://schemas.openxmlformats.org/drawingml/2006/chart" xmlns:dgm="http://schemas.openxmlformats.org/drawingml/2006/diagram" xmlns:o="urn:schemas-microsoft-com:office:office" xmlns:v="urn:schemas-microsoft-com:vml" xmlns:pvml="urn:schemas-microsoft-com:office:powerpoint" xmlns:com="http://schemas.openxmlformats.org/drawingml/2006/compatibility" xmlns:p14="http://schemas.microsoft.com/office/powerpoint/2010/main" xmlns:p15="http://schemas.microsoft.com/office/powerpoint/2012/main" xmlns:ahyp="http://schemas.microsoft.com/office/drawing/2018/hyperlinkcolor">
+  <p:cSld>
+    <p:bg>
+      <p:bgPr>
+        <a:blipFill>
+          <a:blip r:embed="rId3">
+            <a:alphaModFix/>
+          </a:blip>
+          <a:stretch>
+            <a:fillRect/>
+          </a:stretch>
+        </a:blipFill>
+      </p:bgPr>
+    </p:bg>
+    <p:spTree>
+      <p:nvGrpSpPr>
+        <p:cNvPr id="591" name="Shape 591"/>
+        <p:cNvGrpSpPr/>
+        <p:nvPr/>
+      </p:nvGrpSpPr>
+      <p:grpSpPr>
+        <a:xfrm>
+          <a:off x="0" y="0"/>
+          <a:ext cx="0" cy="0"/>
+          <a:chOff x="0" y="0"/>
+          <a:chExt cx="0" cy="0"/>
+        </a:xfrm>
+      </p:grpSpPr>
+      <p:sp>
+        <p:nvSpPr>
+          <p:cNvPr id="592" name="Google Shape;592;p53"/>
+          <p:cNvSpPr txBox="1"/>
+          <p:nvPr/>
+        </p:nvSpPr>
+        <p:spPr>
+          <a:xfrm>
+            <a:off x="3330375" y="0"/>
+            <a:ext cx="5451600" cy="330900"/>
+          </a:xfrm>
+          <a:prstGeom prst="rect">
+            <a:avLst/>
+          </a:prstGeom>
+          <a:noFill/>
+          <a:ln>
+            <a:noFill/>
+          </a:ln>
+        </p:spPr>
+        <p:txBody>
+          <a:bodyPr anchorCtr="0" anchor="t" bIns="91425" lIns="91425" spcFirstLastPara="1" rIns="91425" wrap="square" tIns="21600">
+            <a:noAutofit/>
+          </a:bodyPr>
+          <a:lstStyle/>
+          <a:p>
+            <a:pPr indent="0" lvl="0" marL="0" rtl="0" algn="l">
+              <a:spcBef>
+                <a:spcPts val="0"/>
+              </a:spcBef>
+              <a:spcAft>
+                <a:spcPts val="0"/>
+              </a:spcAft>
+              <a:buNone/>
+            </a:pPr>
+            <a:r>
+              <a:rPr b="1" lang="fr" sz="1800"/>
+              <a:t>Tool – Online Version</a:t>
+            </a:r>
+            <a:endParaRPr b="1" sz="1800"/>
+          </a:p>
+        </p:txBody>
+      </p:sp>
+      <p:sp>
+        <p:nvSpPr>
+          <p:cNvPr id="593" name="Google Shape;593;p53"/>
+          <p:cNvSpPr txBox="1"/>
+          <p:nvPr/>
+        </p:nvSpPr>
+        <p:spPr>
+          <a:xfrm>
+            <a:off x="462000" y="3982050"/>
+            <a:ext cx="8220000" cy="393600"/>
+          </a:xfrm>
+          <a:prstGeom prst="rect">
+            <a:avLst/>
+          </a:prstGeom>
+          <a:noFill/>
+          <a:ln>
+            <a:noFill/>
+          </a:ln>
+        </p:spPr>
+        <p:txBody>
+          <a:bodyPr anchorCtr="0" anchor="t" bIns="91425" lIns="91425" spcFirstLastPara="1" rIns="91425" wrap="square" tIns="91425">
+            <a:noAutofit/>
+          </a:bodyPr>
+          <a:lstStyle/>
+          <a:p>
+            <a:pPr indent="0" lvl="0" marL="0" rtl="0" algn="l">
+              <a:spcBef>
+                <a:spcPts val="0"/>
+              </a:spcBef>
+              <a:spcAft>
+                <a:spcPts val="0"/>
+              </a:spcAft>
+              <a:buNone/>
+            </a:pPr>
+            <a:r>
+              <a:rPr lang="fr" sz="1800">
+                <a:solidFill>
+                  <a:schemeClr val="dk1"/>
+                </a:solidFill>
+              </a:rPr>
+              <a:t>Link:  </a:t>
+            </a:r>
+            <a:r>
+              <a:rPr lang="fr" sz="1800" u="sng">
+                <a:solidFill>
+                  <a:schemeClr val="hlink"/>
+                </a:solidFill>
+                <a:hlinkClick r:id="rId4"/>
+              </a:rPr>
+              <a:t>https://quentinnivon.github.io/pages/givup.html</a:t>
+            </a:r>
+            <a:endParaRPr sz="1800">
+              <a:solidFill>
+                <a:schemeClr val="dk1"/>
+              </a:solidFill>
+            </a:endParaRPr>
+          </a:p>
+        </p:txBody>
+      </p:sp>
+      <p:pic>
+        <p:nvPicPr>
+          <p:cNvPr id="594" name="Google Shape;594;p53" title="gif_icsoc.mp4">
+            <a:hlinkClick r:id="rId5"/>
+          </p:cNvPr>
+          <p:cNvPicPr preferRelativeResize="0"/>
+          <p:nvPr/>
+        </p:nvPicPr>
+        <p:blipFill>
+          <a:blip r:embed="rId6">
+            <a:alphaModFix/>
+          </a:blip>
+          <a:stretch>
+            <a:fillRect/>
+          </a:stretch>
+        </p:blipFill>
+        <p:spPr>
+          <a:xfrm>
+            <a:off x="462000" y="540500"/>
+            <a:ext cx="8220000" cy="3332000"/>
+          </a:xfrm>
+          <a:prstGeom prst="rect">
+            <a:avLst/>
+          </a:prstGeom>
+          <a:noFill/>
+          <a:ln>
+            <a:noFill/>
+          </a:ln>
+        </p:spPr>
+      </p:pic>
+      <p:sp>
+        <p:nvSpPr>
+          <p:cNvPr id="595" name="Google Shape;595;p53"/>
+          <p:cNvSpPr txBox="1"/>
+          <p:nvPr>
+            <p:ph idx="12" type="sldNum"/>
+          </p:nvPr>
+        </p:nvSpPr>
+        <p:spPr>
+          <a:xfrm>
+            <a:off x="8472458" y="4663217"/>
+            <a:ext cx="548700" cy="393600"/>
+          </a:xfrm>
+          <a:prstGeom prst="rect">
+            <a:avLst/>
+          </a:prstGeom>
+        </p:spPr>
+        <p:txBody>
+          <a:bodyPr anchorCtr="0" anchor="ctr" bIns="91425" lIns="91425" spcFirstLastPara="1" rIns="91425" wrap="square" tIns="91425">
+            <a:normAutofit/>
+          </a:bodyPr>
+          <a:lstStyle/>
+          <a:p>
+            <a:pPr indent="0" lvl="0" marL="0" rtl="0" algn="r">
+              <a:spcBef>
+                <a:spcPts val="0"/>
+              </a:spcBef>
+              <a:spcAft>
+                <a:spcPts val="0"/>
+              </a:spcAft>
+              <a:buNone/>
+            </a:pPr>
+            <a:fld id="{00000000-1234-1234-1234-123412341234}" type="slidenum">
+              <a:rPr lang="fr"/>
+              <a:t>‹#›</a:t>
+            </a:fld>
+            <a:endParaRPr/>
+          </a:p>
+        </p:txBody>
+      </p:sp>
+    </p:spTree>
+  </p:cSld>
+  <p:clrMapOvr>
+    <a:masterClrMapping/>
+  </p:clrMapOvr>
+  <p:timing>
+    <p:tnLst>
+      <p:par>
+        <p:cTn dur="indefinite" nodeType="tmRoot" restart="never">
+          <p:childTnLst>
+            <p:seq concurrent="1" nextAc="seek">
+              <p:cTn dur="indefinite" id="2" nodeType="mainSeq">
+                <p:childTnLst>
+                  <p:par>
+                    <p:cTn fill="hold">
+                      <p:stCondLst>
+                        <p:cond delay="indefinite"/>
+                        <p:cond evt="onBegin" delay="0">
+                          <p:tn val="2"/>
+                        </p:cond>
+                      </p:stCondLst>
+                      <p:childTnLst>
+                        <p:par>
+                          <p:cTn fill="hold">
+                            <p:stCondLst>
+                              <p:cond delay="0"/>
+                            </p:stCondLst>
+                            <p:childTnLst>
+                              <p:par>
+                                <p:cTn fill="hold" nodeType="withEffect" presetClass="entr" presetID="10" presetSubtype="0">
+                                  <p:stCondLst>
+                                    <p:cond delay="0"/>
+                                  </p:stCondLst>
+                                  <p:childTnLst>
+                                    <p:set>
+                                      <p:cBhvr>
+                                        <p:cTn dur="1" fill="hold">
+                                          <p:stCondLst>
+                                            <p:cond delay="0"/>
+                                          </p:stCondLst>
+                                        </p:cTn>
+                                        <p:tgtEl>
+                                          <p:spTgt spid="594"/>
+                                        </p:tgtEl>
+                                        <p:attrNameLst>
+                                          <p:attrName>style.visibility</p:attrName>
+                                        </p:attrNameLst>
+                                      </p:cBhvr>
+                                      <p:to>
+                                        <p:strVal val="visible"/>
+                                      </p:to>
+                                    </p:set>
+                                    <p:animEffect filter="fade" transition="in">
+                                      <p:cBhvr>
+                                        <p:cTn dur="1000"/>
+                                        <p:tgtEl>
+                                          <p:spTgt spid="594"/>
+                                        </p:tgtEl>
+                                      </p:cBhvr>
+                                    </p:animEffect>
+                                  </p:childTnLst>
+                                </p:cTn>
+                              </p:par>
+                            </p:childTnLst>
+                          </p:cTn>
+                        </p:par>
+                      </p:childTnLst>
+                    </p:cTn>
+                  </p:par>
+                </p:childTnLst>
+              </p:cTn>
+              <p:prevCondLst>
+                <p:cond evt="onPrev">
+                  <p:tgtEl>
+                    <p:sldTgt/>
+                  </p:tgtEl>
+                </p:cond>
+              </p:prevCondLst>
+              <p:nextCondLst>
+                <p:cond evt="onNext">
+                  <p:tgtEl>
+                    <p:sldTgt/>
+                  </p:tgtEl>
+                </p:cond>
+              </p:nextCondLst>
+            </p:seq>
+          </p:childTnLst>
+        </p:cTn>
+      </p:par>
+    </p:tnLst>
+  </p:timing>
+</p:sld>
+</file>
+
+<file path=ppt/slides/slide42.xml><?xml version="1.0" encoding="utf-8"?>
+<p:sld xmlns:a="http://schemas.openxmlformats.org/drawingml/2006/main" xmlns:r="http://schemas.openxmlformats.org/officeDocument/2006/relationships" xmlns:mc="http://schemas.openxmlformats.org/markup-compatibility/2006" xmlns:mv="urn:schemas-microsoft-com:mac:vml" xmlns:p="http://schemas.openxmlformats.org/presentationml/2006/main" xmlns:c="http://schemas.openxmlformats.org/drawingml/2006/chart" xmlns:dgm="http://schemas.openxmlformats.org/drawingml/2006/diagram" xmlns:o="urn:schemas-microsoft-com:office:office" xmlns:v="urn:schemas-microsoft-com:vml" xmlns:pvml="urn:schemas-microsoft-com:office:powerpoint" xmlns:com="http://schemas.openxmlformats.org/drawingml/2006/compatibility" xmlns:p14="http://schemas.microsoft.com/office/powerpoint/2010/main" xmlns:p15="http://schemas.microsoft.com/office/powerpoint/2012/main" xmlns:ahyp="http://schemas.microsoft.com/office/drawing/2018/hyperlinkcolor">
+  <p:cSld>
+    <p:bg>
+      <p:bgPr>
+        <a:blipFill>
+          <a:blip r:embed="rId3">
+            <a:alphaModFix/>
+          </a:blip>
+          <a:stretch>
+            <a:fillRect/>
+          </a:stretch>
+        </a:blipFill>
+      </p:bgPr>
+    </p:bg>
+    <p:spTree>
+      <p:nvGrpSpPr>
+        <p:cNvPr id="599" name="Shape 599"/>
+        <p:cNvGrpSpPr/>
+        <p:nvPr/>
+      </p:nvGrpSpPr>
+      <p:grpSpPr>
+        <a:xfrm>
+          <a:off x="0" y="0"/>
+          <a:ext cx="0" cy="0"/>
+          <a:chOff x="0" y="0"/>
+          <a:chExt cx="0" cy="0"/>
+        </a:xfrm>
+      </p:grpSpPr>
+      <p:sp>
+        <p:nvSpPr>
+          <p:cNvPr id="600" name="Google Shape;600;p54"/>
+          <p:cNvSpPr txBox="1"/>
+          <p:nvPr/>
+        </p:nvSpPr>
+        <p:spPr>
+          <a:xfrm>
+            <a:off x="3330375" y="0"/>
+            <a:ext cx="5451600" cy="330900"/>
+          </a:xfrm>
+          <a:prstGeom prst="rect">
+            <a:avLst/>
+          </a:prstGeom>
+          <a:noFill/>
+          <a:ln>
+            <a:noFill/>
+          </a:ln>
+        </p:spPr>
+        <p:txBody>
+          <a:bodyPr anchorCtr="0" anchor="t" bIns="91425" lIns="91425" spcFirstLastPara="1" rIns="91425" wrap="square" tIns="21600">
+            <a:noAutofit/>
+          </a:bodyPr>
+          <a:lstStyle/>
+          <a:p>
+            <a:pPr indent="0" lvl="0" marL="0" rtl="0" algn="l">
+              <a:spcBef>
+                <a:spcPts val="0"/>
+              </a:spcBef>
+              <a:spcAft>
+                <a:spcPts val="0"/>
+              </a:spcAft>
+              <a:buNone/>
+            </a:pPr>
+            <a:r>
+              <a:rPr b="1" lang="fr" sz="1800"/>
+              <a:t>Conclusion</a:t>
+            </a:r>
+            <a:endParaRPr b="1" sz="1800"/>
+          </a:p>
+        </p:txBody>
+      </p:sp>
+      <p:sp>
+        <p:nvSpPr>
+          <p:cNvPr id="601" name="Google Shape;601;p54"/>
+          <p:cNvSpPr txBox="1"/>
+          <p:nvPr/>
+        </p:nvSpPr>
+        <p:spPr>
+          <a:xfrm>
+            <a:off x="727650" y="541275"/>
+            <a:ext cx="7688700" cy="3991500"/>
+          </a:xfrm>
+          <a:prstGeom prst="rect">
+            <a:avLst/>
+          </a:prstGeom>
+          <a:noFill/>
+          <a:ln>
+            <a:noFill/>
+          </a:ln>
+        </p:spPr>
+        <p:txBody>
+          <a:bodyPr anchorCtr="0" anchor="t" bIns="91425" lIns="91425" spcFirstLastPara="1" rIns="91425" wrap="square" tIns="91425">
+            <a:normAutofit/>
+          </a:bodyPr>
+          <a:lstStyle/>
+          <a:p>
+            <a:pPr indent="0" lvl="0" marL="0" rtl="0" algn="l">
+              <a:lnSpc>
+                <a:spcPct val="115000"/>
+              </a:lnSpc>
+              <a:spcBef>
+                <a:spcPts val="0"/>
+              </a:spcBef>
+              <a:spcAft>
+                <a:spcPts val="0"/>
+              </a:spcAft>
+              <a:buNone/>
+            </a:pPr>
+            <a:r>
+              <a:rPr lang="fr" sz="1800">
+                <a:latin typeface="Lato"/>
+                <a:ea typeface="Lato"/>
+                <a:cs typeface="Lato"/>
+                <a:sym typeface="Lato"/>
+              </a:rPr>
+              <a:t>In this work, we proposed an approach aiming at automatically designing </a:t>
+            </a:r>
+            <a:r>
+              <a:rPr b="1" lang="fr" sz="1800">
+                <a:solidFill>
+                  <a:srgbClr val="FF0000"/>
+                </a:solidFill>
+                <a:latin typeface="Lato"/>
+                <a:ea typeface="Lato"/>
+                <a:cs typeface="Lato"/>
+                <a:sym typeface="Lato"/>
+              </a:rPr>
+              <a:t>syntactically and semantically correct BPMN</a:t>
+            </a:r>
+            <a:r>
+              <a:rPr lang="fr" sz="1800">
+                <a:latin typeface="Lato"/>
+                <a:ea typeface="Lato"/>
+                <a:cs typeface="Lato"/>
+                <a:sym typeface="Lato"/>
+              </a:rPr>
+              <a:t> processes from a </a:t>
+            </a:r>
+            <a:r>
+              <a:rPr b="1" lang="fr" sz="1800">
+                <a:solidFill>
+                  <a:srgbClr val="FF0000"/>
+                </a:solidFill>
+                <a:latin typeface="Lato"/>
+                <a:ea typeface="Lato"/>
+                <a:cs typeface="Lato"/>
+                <a:sym typeface="Lato"/>
+              </a:rPr>
+              <a:t>textual description</a:t>
+            </a:r>
+            <a:r>
+              <a:rPr lang="fr" sz="1800">
+                <a:latin typeface="Lato"/>
+                <a:ea typeface="Lato"/>
+                <a:cs typeface="Lato"/>
+                <a:sym typeface="Lato"/>
+              </a:rPr>
+              <a:t> of the requirements.</a:t>
+            </a:r>
+            <a:endParaRPr sz="1800">
+              <a:latin typeface="Lato"/>
+              <a:ea typeface="Lato"/>
+              <a:cs typeface="Lato"/>
+              <a:sym typeface="Lato"/>
+            </a:endParaRPr>
+          </a:p>
+          <a:p>
+            <a:pPr indent="0" lvl="0" marL="0" rtl="0" algn="l">
+              <a:lnSpc>
+                <a:spcPct val="115000"/>
+              </a:lnSpc>
+              <a:spcBef>
+                <a:spcPts val="1200"/>
+              </a:spcBef>
+              <a:spcAft>
+                <a:spcPts val="0"/>
+              </a:spcAft>
+              <a:buNone/>
+            </a:pPr>
+            <a:r>
+              <a:rPr lang="fr" sz="1800">
+                <a:latin typeface="Lato"/>
+                <a:ea typeface="Lato"/>
+                <a:cs typeface="Lato"/>
+                <a:sym typeface="Lato"/>
+              </a:rPr>
+              <a:t>We </a:t>
+            </a:r>
+            <a:r>
+              <a:rPr b="1" lang="fr" sz="1800">
+                <a:solidFill>
+                  <a:srgbClr val="FF0000"/>
+                </a:solidFill>
+                <a:latin typeface="Lato"/>
+                <a:ea typeface="Lato"/>
+                <a:cs typeface="Lato"/>
+                <a:sym typeface="Lato"/>
+              </a:rPr>
+              <a:t>already worked</a:t>
+            </a:r>
+            <a:r>
+              <a:rPr lang="fr" sz="1800">
+                <a:latin typeface="Lato"/>
+                <a:ea typeface="Lato"/>
+                <a:cs typeface="Lato"/>
+                <a:sym typeface="Lato"/>
+              </a:rPr>
+              <a:t> on several </a:t>
+            </a:r>
+            <a:r>
+              <a:rPr b="1" lang="fr" sz="1800">
+                <a:solidFill>
+                  <a:srgbClr val="FF0000"/>
+                </a:solidFill>
+                <a:latin typeface="Lato"/>
+                <a:ea typeface="Lato"/>
+                <a:cs typeface="Lato"/>
+                <a:sym typeface="Lato"/>
+              </a:rPr>
+              <a:t>perspectives </a:t>
+            </a:r>
+            <a:r>
+              <a:rPr lang="fr" sz="1800">
+                <a:solidFill>
+                  <a:srgbClr val="1A1A1A"/>
+                </a:solidFill>
+                <a:latin typeface="Lato"/>
+                <a:ea typeface="Lato"/>
+                <a:cs typeface="Lato"/>
+                <a:sym typeface="Lato"/>
+              </a:rPr>
+              <a:t>of this work</a:t>
+            </a:r>
+            <a:r>
+              <a:rPr lang="fr" sz="1800">
+                <a:latin typeface="Lato"/>
+                <a:ea typeface="Lato"/>
+                <a:cs typeface="Lato"/>
+                <a:sym typeface="Lato"/>
+              </a:rPr>
+              <a:t>:</a:t>
+            </a:r>
+            <a:endParaRPr sz="1800">
+              <a:latin typeface="Lato"/>
+              <a:ea typeface="Lato"/>
+              <a:cs typeface="Lato"/>
+              <a:sym typeface="Lato"/>
+            </a:endParaRPr>
+          </a:p>
+          <a:p>
+            <a:pPr indent="-342900" lvl="0" marL="457200" rtl="0" algn="l">
+              <a:lnSpc>
+                <a:spcPct val="115000"/>
+              </a:lnSpc>
+              <a:spcBef>
+                <a:spcPts val="1200"/>
+              </a:spcBef>
+              <a:spcAft>
+                <a:spcPts val="0"/>
+              </a:spcAft>
+              <a:buSzPts val="1800"/>
+              <a:buFont typeface="Lato"/>
+              <a:buChar char="●"/>
+            </a:pPr>
+            <a:r>
+              <a:rPr lang="fr" sz="1800">
+                <a:latin typeface="Lato"/>
+                <a:ea typeface="Lato"/>
+                <a:cs typeface="Lato"/>
+                <a:sym typeface="Lato"/>
+              </a:rPr>
+              <a:t>Get rid of ASTs to allow more complex constructs (</a:t>
+            </a:r>
+            <a:r>
+              <a:rPr lang="fr" sz="1800">
+                <a:latin typeface="Lato"/>
+                <a:ea typeface="Lato"/>
+                <a:cs typeface="Lato"/>
+                <a:sym typeface="Lato"/>
+              </a:rPr>
+              <a:t>intricate</a:t>
+            </a:r>
+            <a:r>
+              <a:rPr lang="fr" sz="1800">
+                <a:latin typeface="Lato"/>
+                <a:ea typeface="Lato"/>
+                <a:cs typeface="Lato"/>
+                <a:sym typeface="Lato"/>
+              </a:rPr>
+              <a:t> loops/unbalanced gateways)</a:t>
+            </a:r>
+            <a:endParaRPr sz="1800">
+              <a:latin typeface="Lato"/>
+              <a:ea typeface="Lato"/>
+              <a:cs typeface="Lato"/>
+              <a:sym typeface="Lato"/>
+            </a:endParaRPr>
+          </a:p>
+          <a:p>
+            <a:pPr indent="-342900" lvl="0" marL="457200" rtl="0" algn="l">
+              <a:lnSpc>
+                <a:spcPct val="115000"/>
+              </a:lnSpc>
+              <a:spcBef>
+                <a:spcPts val="0"/>
+              </a:spcBef>
+              <a:spcAft>
+                <a:spcPts val="0"/>
+              </a:spcAft>
+              <a:buSzPts val="1800"/>
+              <a:buFont typeface="Lato"/>
+              <a:buChar char="●"/>
+            </a:pPr>
+            <a:r>
+              <a:rPr lang="fr" sz="1800">
+                <a:latin typeface="Lato"/>
+                <a:ea typeface="Lato"/>
+                <a:cs typeface="Lato"/>
+                <a:sym typeface="Lato"/>
+              </a:rPr>
+              <a:t>Formalise the transformation operations</a:t>
+            </a:r>
+            <a:endParaRPr sz="1800">
+              <a:latin typeface="Lato"/>
+              <a:ea typeface="Lato"/>
+              <a:cs typeface="Lato"/>
+              <a:sym typeface="Lato"/>
+            </a:endParaRPr>
+          </a:p>
+          <a:p>
+            <a:pPr indent="-342900" lvl="0" marL="457200" rtl="0" algn="l">
+              <a:lnSpc>
+                <a:spcPct val="115000"/>
+              </a:lnSpc>
+              <a:spcBef>
+                <a:spcPts val="0"/>
+              </a:spcBef>
+              <a:spcAft>
+                <a:spcPts val="0"/>
+              </a:spcAft>
+              <a:buSzPts val="1800"/>
+              <a:buFont typeface="Lato"/>
+              <a:buChar char="●"/>
+            </a:pPr>
+            <a:r>
+              <a:rPr lang="fr" sz="1800">
+                <a:solidFill>
+                  <a:schemeClr val="dk1"/>
+                </a:solidFill>
+                <a:latin typeface="Lato"/>
+                <a:ea typeface="Lato"/>
+                <a:cs typeface="Lato"/>
+                <a:sym typeface="Lato"/>
+              </a:rPr>
+              <a:t>Add new features (such as model checking of textual properties)</a:t>
+            </a:r>
+            <a:endParaRPr sz="1800">
+              <a:solidFill>
+                <a:schemeClr val="dk1"/>
+              </a:solidFill>
+              <a:latin typeface="Lato"/>
+              <a:ea typeface="Lato"/>
+              <a:cs typeface="Lato"/>
+              <a:sym typeface="Lato"/>
+            </a:endParaRPr>
+          </a:p>
+          <a:p>
+            <a:pPr indent="0" lvl="0" marL="0" rtl="0" algn="l">
+              <a:lnSpc>
+                <a:spcPct val="115000"/>
+              </a:lnSpc>
+              <a:spcBef>
+                <a:spcPts val="1200"/>
+              </a:spcBef>
+              <a:spcAft>
+                <a:spcPts val="0"/>
+              </a:spcAft>
+              <a:buNone/>
+            </a:pPr>
+            <a:r>
+              <a:rPr lang="fr" sz="1800">
+                <a:solidFill>
+                  <a:schemeClr val="dk1"/>
+                </a:solidFill>
+                <a:latin typeface="Lato"/>
+                <a:ea typeface="Lato"/>
+                <a:cs typeface="Lato"/>
+                <a:sym typeface="Lato"/>
+              </a:rPr>
+              <a:t>While some others are still </a:t>
+            </a:r>
+            <a:r>
+              <a:rPr b="1" lang="fr" sz="1800">
+                <a:solidFill>
+                  <a:srgbClr val="FF0000"/>
+                </a:solidFill>
+                <a:latin typeface="Lato"/>
+                <a:ea typeface="Lato"/>
+                <a:cs typeface="Lato"/>
+                <a:sym typeface="Lato"/>
+              </a:rPr>
+              <a:t>ongoing</a:t>
+            </a:r>
+            <a:r>
+              <a:rPr lang="fr" sz="1800">
+                <a:solidFill>
+                  <a:schemeClr val="dk1"/>
+                </a:solidFill>
+                <a:latin typeface="Lato"/>
+                <a:ea typeface="Lato"/>
+                <a:cs typeface="Lato"/>
+                <a:sym typeface="Lato"/>
+              </a:rPr>
+              <a:t>:</a:t>
+            </a:r>
+            <a:endParaRPr sz="1800">
+              <a:solidFill>
+                <a:schemeClr val="dk1"/>
+              </a:solidFill>
+              <a:latin typeface="Lato"/>
+              <a:ea typeface="Lato"/>
+              <a:cs typeface="Lato"/>
+              <a:sym typeface="Lato"/>
+            </a:endParaRPr>
+          </a:p>
+          <a:p>
+            <a:pPr indent="-342900" lvl="0" marL="457200" rtl="0" algn="l">
+              <a:lnSpc>
+                <a:spcPct val="115000"/>
+              </a:lnSpc>
+              <a:spcBef>
+                <a:spcPts val="1200"/>
+              </a:spcBef>
+              <a:spcAft>
+                <a:spcPts val="0"/>
+              </a:spcAft>
+              <a:buSzPts val="1800"/>
+              <a:buFont typeface="Lato"/>
+              <a:buChar char="●"/>
+            </a:pPr>
+            <a:r>
+              <a:rPr lang="fr" sz="1800">
+                <a:latin typeface="Lato"/>
+                <a:ea typeface="Lato"/>
+                <a:cs typeface="Lato"/>
+                <a:sym typeface="Lato"/>
+              </a:rPr>
+              <a:t>Adapt the description to (visual) process changes</a:t>
+            </a:r>
+            <a:endParaRPr sz="1800">
+              <a:latin typeface="Lato"/>
+              <a:ea typeface="Lato"/>
+              <a:cs typeface="Lato"/>
+              <a:sym typeface="Lato"/>
+            </a:endParaRPr>
+          </a:p>
+        </p:txBody>
+      </p:sp>
+      <p:sp>
+        <p:nvSpPr>
+          <p:cNvPr id="602" name="Google Shape;602;p54"/>
+          <p:cNvSpPr txBox="1"/>
+          <p:nvPr>
+            <p:ph idx="12" type="sldNum"/>
+          </p:nvPr>
+        </p:nvSpPr>
+        <p:spPr>
+          <a:xfrm>
+            <a:off x="8472458" y="4663217"/>
+            <a:ext cx="548700" cy="393600"/>
+          </a:xfrm>
+          <a:prstGeom prst="rect">
+            <a:avLst/>
+          </a:prstGeom>
+        </p:spPr>
+        <p:txBody>
+          <a:bodyPr anchorCtr="0" anchor="ctr" bIns="91425" lIns="91425" spcFirstLastPara="1" rIns="91425" wrap="square" tIns="91425">
+            <a:normAutofit/>
+          </a:bodyPr>
+          <a:lstStyle/>
+          <a:p>
+            <a:pPr indent="0" lvl="0" marL="0" rtl="0" algn="r">
+              <a:spcBef>
+                <a:spcPts val="0"/>
+              </a:spcBef>
+              <a:spcAft>
+                <a:spcPts val="0"/>
+              </a:spcAft>
+              <a:buNone/>
+            </a:pPr>
+            <a:fld id="{00000000-1234-1234-1234-123412341234}" type="slidenum">
+              <a:rPr lang="fr"/>
+              <a:t>‹#›</a:t>
+            </a:fld>
+            <a:endParaRPr/>
+          </a:p>
+        </p:txBody>
+      </p:sp>
+      <p:sp>
+        <p:nvSpPr>
+          <p:cNvPr id="603" name="Google Shape;603;p54"/>
+          <p:cNvSpPr/>
+          <p:nvPr/>
+        </p:nvSpPr>
+        <p:spPr>
+          <a:xfrm>
+            <a:off x="7259400" y="2223325"/>
+            <a:ext cx="358500" cy="944400"/>
+          </a:xfrm>
+          <a:prstGeom prst="rightBrace">
+            <a:avLst>
+              <a:gd fmla="val 50000" name="adj1"/>
+              <a:gd fmla="val 50000" name="adj2"/>
+            </a:avLst>
+          </a:prstGeom>
+          <a:noFill/>
+          <a:ln cap="flat" cmpd="sng" w="19050">
+            <a:solidFill>
+              <a:srgbClr val="4A86E8"/>
+            </a:solidFill>
+            <a:prstDash val="solid"/>
+            <a:round/>
+            <a:headEnd len="sm" w="sm" type="none"/>
+            <a:tailEnd len="sm" w="sm" type="none"/>
+          </a:ln>
+        </p:spPr>
+        <p:txBody>
+          <a:bodyPr anchorCtr="0" anchor="ctr" bIns="91425" lIns="91425" spcFirstLastPara="1" rIns="91425" wrap="square" tIns="91425">
+            <a:noAutofit/>
+          </a:bodyPr>
+          <a:lstStyle/>
+          <a:p>
+            <a:pPr indent="0" lvl="0" marL="0" rtl="0" algn="ctr">
+              <a:spcBef>
+                <a:spcPts val="0"/>
+              </a:spcBef>
+              <a:spcAft>
+                <a:spcPts val="0"/>
+              </a:spcAft>
+              <a:buNone/>
+            </a:pPr>
+            <a:r>
+              <a:t/>
+            </a:r>
+            <a:endParaRPr>
+              <a:solidFill>
+                <a:srgbClr val="0000FF"/>
+              </a:solidFill>
+            </a:endParaRPr>
+          </a:p>
+        </p:txBody>
+      </p:sp>
+      <p:sp>
+        <p:nvSpPr>
+          <p:cNvPr id="604" name="Google Shape;604;p54"/>
+          <p:cNvSpPr txBox="1"/>
+          <p:nvPr/>
+        </p:nvSpPr>
+        <p:spPr>
+          <a:xfrm>
+            <a:off x="7617900" y="2530075"/>
+            <a:ext cx="1274400" cy="330900"/>
+          </a:xfrm>
+          <a:prstGeom prst="rect">
+            <a:avLst/>
+          </a:prstGeom>
+          <a:noFill/>
+          <a:ln>
+            <a:noFill/>
+          </a:ln>
+        </p:spPr>
+        <p:txBody>
+          <a:bodyPr anchorCtr="0" anchor="ctr" bIns="91425" lIns="91425" spcFirstLastPara="1" rIns="91425" wrap="square" tIns="91425">
+            <a:noAutofit/>
+          </a:bodyPr>
+          <a:lstStyle/>
+          <a:p>
+            <a:pPr indent="0" lvl="0" marL="0" rtl="0" algn="ctr">
+              <a:spcBef>
+                <a:spcPts val="0"/>
+              </a:spcBef>
+              <a:spcAft>
+                <a:spcPts val="0"/>
+              </a:spcAft>
+              <a:buNone/>
+            </a:pPr>
+            <a:r>
+              <a:rPr lang="fr" sz="1800">
+                <a:solidFill>
+                  <a:schemeClr val="accent1"/>
+                </a:solidFill>
+              </a:rPr>
+              <a:t>[TSE’25]</a:t>
+            </a:r>
+            <a:endParaRPr sz="1800">
+              <a:solidFill>
+                <a:schemeClr val="accent1"/>
+              </a:solidFill>
+            </a:endParaRPr>
+          </a:p>
+        </p:txBody>
+      </p:sp>
+      <p:sp>
+        <p:nvSpPr>
+          <p:cNvPr id="605" name="Google Shape;605;p54"/>
+          <p:cNvSpPr/>
+          <p:nvPr/>
+        </p:nvSpPr>
+        <p:spPr>
+          <a:xfrm>
+            <a:off x="7790300" y="3074350"/>
+            <a:ext cx="171900" cy="453900"/>
+          </a:xfrm>
+          <a:prstGeom prst="rightBrace">
+            <a:avLst>
+              <a:gd fmla="val 50000" name="adj1"/>
+              <a:gd fmla="val 50000" name="adj2"/>
+            </a:avLst>
+          </a:prstGeom>
+          <a:noFill/>
+          <a:ln cap="flat" cmpd="sng" w="19050">
+            <a:solidFill>
+              <a:srgbClr val="6AA84F"/>
+            </a:solidFill>
+            <a:prstDash val="solid"/>
+            <a:round/>
+            <a:headEnd len="sm" w="sm" type="none"/>
+            <a:tailEnd len="sm" w="sm" type="none"/>
+          </a:ln>
+        </p:spPr>
+        <p:txBody>
+          <a:bodyPr anchorCtr="0" anchor="ctr" bIns="91425" lIns="91425" spcFirstLastPara="1" rIns="91425" wrap="square" tIns="91425">
+            <a:noAutofit/>
+          </a:bodyPr>
+          <a:lstStyle/>
+          <a:p>
+            <a:pPr indent="0" lvl="0" marL="0" rtl="0" algn="ctr">
+              <a:spcBef>
+                <a:spcPts val="0"/>
+              </a:spcBef>
+              <a:spcAft>
+                <a:spcPts val="0"/>
+              </a:spcAft>
+              <a:buNone/>
+            </a:pPr>
+            <a:r>
+              <a:t/>
+            </a:r>
+            <a:endParaRPr>
+              <a:solidFill>
+                <a:srgbClr val="6AA84F"/>
+              </a:solidFill>
+            </a:endParaRPr>
+          </a:p>
+        </p:txBody>
+      </p:sp>
+      <p:sp>
+        <p:nvSpPr>
+          <p:cNvPr id="606" name="Google Shape;606;p54"/>
+          <p:cNvSpPr txBox="1"/>
+          <p:nvPr/>
+        </p:nvSpPr>
+        <p:spPr>
+          <a:xfrm>
+            <a:off x="7842700" y="3135850"/>
+            <a:ext cx="1225800" cy="330900"/>
+          </a:xfrm>
+          <a:prstGeom prst="rect">
+            <a:avLst/>
+          </a:prstGeom>
+          <a:noFill/>
+          <a:ln>
+            <a:noFill/>
+          </a:ln>
+        </p:spPr>
+        <p:txBody>
+          <a:bodyPr anchorCtr="0" anchor="ctr" bIns="91425" lIns="91425" spcFirstLastPara="1" rIns="91425" wrap="square" tIns="91425">
+            <a:noAutofit/>
+          </a:bodyPr>
+          <a:lstStyle/>
+          <a:p>
+            <a:pPr indent="0" lvl="0" marL="0" rtl="0" algn="ctr">
+              <a:spcBef>
+                <a:spcPts val="0"/>
+              </a:spcBef>
+              <a:spcAft>
+                <a:spcPts val="0"/>
+              </a:spcAft>
+              <a:buNone/>
+            </a:pPr>
+            <a:r>
+              <a:rPr lang="fr" sz="1800">
+                <a:solidFill>
+                  <a:srgbClr val="6AA84F"/>
+                </a:solidFill>
+              </a:rPr>
+              <a:t>[F</a:t>
+            </a:r>
+            <a:r>
+              <a:rPr lang="fr" sz="1800">
+                <a:solidFill>
+                  <a:srgbClr val="6AA84F"/>
+                </a:solidFill>
+              </a:rPr>
+              <a:t>SE’25]</a:t>
+            </a:r>
+            <a:endParaRPr sz="1800">
+              <a:solidFill>
+                <a:srgbClr val="6AA84F"/>
+              </a:solidFill>
+            </a:endParaRPr>
+          </a:p>
+        </p:txBody>
+      </p:sp>
+      <p:sp>
+        <p:nvSpPr>
+          <p:cNvPr id="607" name="Google Shape;607;p54"/>
+          <p:cNvSpPr/>
+          <p:nvPr/>
+        </p:nvSpPr>
+        <p:spPr>
+          <a:xfrm>
+            <a:off x="6228925" y="3995275"/>
+            <a:ext cx="171900" cy="453900"/>
+          </a:xfrm>
+          <a:prstGeom prst="rightBrace">
+            <a:avLst>
+              <a:gd fmla="val 50000" name="adj1"/>
+              <a:gd fmla="val 50000" name="adj2"/>
+            </a:avLst>
+          </a:prstGeom>
+          <a:noFill/>
+          <a:ln cap="flat" cmpd="sng" w="19050">
+            <a:solidFill>
+              <a:srgbClr val="4A86E8"/>
+            </a:solidFill>
+            <a:prstDash val="solid"/>
+            <a:round/>
+            <a:headEnd len="sm" w="sm" type="none"/>
+            <a:tailEnd len="sm" w="sm" type="none"/>
+          </a:ln>
+        </p:spPr>
+        <p:txBody>
+          <a:bodyPr anchorCtr="0" anchor="ctr" bIns="91425" lIns="91425" spcFirstLastPara="1" rIns="91425" wrap="square" tIns="91425">
+            <a:noAutofit/>
+          </a:bodyPr>
+          <a:lstStyle/>
+          <a:p>
+            <a:pPr indent="0" lvl="0" marL="0" rtl="0" algn="ctr">
+              <a:spcBef>
+                <a:spcPts val="0"/>
+              </a:spcBef>
+              <a:spcAft>
+                <a:spcPts val="0"/>
+              </a:spcAft>
+              <a:buNone/>
+            </a:pPr>
+            <a:r>
+              <a:t/>
+            </a:r>
+            <a:endParaRPr>
+              <a:solidFill>
+                <a:srgbClr val="0000FF"/>
+              </a:solidFill>
+            </a:endParaRPr>
+          </a:p>
+        </p:txBody>
+      </p:sp>
+      <p:sp>
+        <p:nvSpPr>
+          <p:cNvPr id="608" name="Google Shape;608;p54"/>
+          <p:cNvSpPr txBox="1"/>
+          <p:nvPr/>
+        </p:nvSpPr>
+        <p:spPr>
+          <a:xfrm>
+            <a:off x="6349050" y="4056775"/>
+            <a:ext cx="1684800" cy="330900"/>
+          </a:xfrm>
+          <a:prstGeom prst="rect">
+            <a:avLst/>
+          </a:prstGeom>
+          <a:noFill/>
+          <a:ln>
+            <a:noFill/>
+          </a:ln>
+        </p:spPr>
+        <p:txBody>
+          <a:bodyPr anchorCtr="0" anchor="ctr" bIns="91425" lIns="91425" spcFirstLastPara="1" rIns="91425" wrap="square" tIns="91425">
+            <a:noAutofit/>
+          </a:bodyPr>
+          <a:lstStyle/>
+          <a:p>
+            <a:pPr indent="0" lvl="0" marL="0" rtl="0" algn="ctr">
+              <a:spcBef>
+                <a:spcPts val="0"/>
+              </a:spcBef>
+              <a:spcAft>
+                <a:spcPts val="0"/>
+              </a:spcAft>
+              <a:buNone/>
+            </a:pPr>
+            <a:r>
+              <a:rPr lang="fr" sz="1800">
+                <a:solidFill>
+                  <a:schemeClr val="accent1"/>
+                </a:solidFill>
+              </a:rPr>
+              <a:t>David’s work</a:t>
+            </a:r>
+            <a:endParaRPr sz="1800">
+              <a:solidFill>
+                <a:schemeClr val="accent1"/>
+              </a:solidFill>
+            </a:endParaRPr>
+          </a:p>
+        </p:txBody>
+      </p:sp>
+    </p:spTree>
+  </p:cSld>
+  <p:clrMapOvr>
+    <a:masterClrMapping/>
+  </p:clrMapOvr>
+</p:sld>
+</file>
+
 <file path=ppt/slides/slide5.xml><?xml version="1.0" encoding="utf-8"?>
 <p:sld xmlns:a="http://schemas.openxmlformats.org/drawingml/2006/main" xmlns:r="http://schemas.openxmlformats.org/officeDocument/2006/relationships" xmlns:mc="http://schemas.openxmlformats.org/markup-compatibility/2006" xmlns:mv="urn:schemas-microsoft-com:mac:vml" xmlns:p="http://schemas.openxmlformats.org/presentationml/2006/main" xmlns:c="http://schemas.openxmlformats.org/drawingml/2006/chart" xmlns:dgm="http://schemas.openxmlformats.org/drawingml/2006/diagram" xmlns:o="urn:schemas-microsoft-com:office:office" xmlns:v="urn:schemas-microsoft-com:vml" xmlns:pvml="urn:schemas-microsoft-com:office:powerpoint" xmlns:com="http://schemas.openxmlformats.org/drawingml/2006/compatibility" xmlns:p14="http://schemas.microsoft.com/office/powerpoint/2010/main" xmlns:p15="http://schemas.microsoft.com/office/powerpoint/2012/main" xmlns:ahyp="http://schemas.microsoft.com/office/drawing/2018/hyperlinkcolor">
   <p:cSld>
@@ -28243,6 +30751,285 @@
 </file>
 
 <file path=ppt/theme/theme1.xml><?xml version="1.0" encoding="utf-8"?>
+<a:theme xmlns:a="http://schemas.openxmlformats.org/drawingml/2006/main" xmlns:r="http://schemas.openxmlformats.org/officeDocument/2006/relationships">
+  <a:themeElements>
+    <a:clrScheme name="Default">
+      <a:dk1>
+        <a:srgbClr val="000000"/>
+      </a:dk1>
+      <a:lt1>
+        <a:srgbClr val="FFFFFF"/>
+      </a:lt1>
+      <a:dk2>
+        <a:srgbClr val="158158"/>
+      </a:dk2>
+      <a:lt2>
+        <a:srgbClr val="F3F3F3"/>
+      </a:lt2>
+      <a:accent1>
+        <a:srgbClr val="058DC7"/>
+      </a:accent1>
+      <a:accent2>
+        <a:srgbClr val="50B432"/>
+      </a:accent2>
+      <a:accent3>
+        <a:srgbClr val="ED561B"/>
+      </a:accent3>
+      <a:accent4>
+        <a:srgbClr val="EDEF00"/>
+      </a:accent4>
+      <a:accent5>
+        <a:srgbClr val="24CBE5"/>
+      </a:accent5>
+      <a:accent6>
+        <a:srgbClr val="64E572"/>
+      </a:accent6>
+      <a:hlink>
+        <a:srgbClr val="2200CC"/>
+      </a:hlink>
+      <a:folHlink>
+        <a:srgbClr val="551A8B"/>
+      </a:folHlink>
+    </a:clrScheme>
+    <a:fontScheme name="Office">
+      <a:majorFont>
+        <a:latin typeface="Arial"/>
+        <a:ea typeface=""/>
+        <a:cs typeface=""/>
+        <a:font script="Jpan" typeface="ＭＳ Ｐゴシック"/>
+        <a:font script="Hang" typeface="맑은 고딕"/>
+        <a:font script="Hans" typeface="宋体"/>
+        <a:font script="Hant" typeface="新細明體"/>
+        <a:font script="Arab" typeface="Times New Roman"/>
+        <a:font script="Hebr" typeface="Times New Roman"/>
+        <a:font script="Thai" typeface="Angsana New"/>
+        <a:font script="Ethi" typeface="Nyala"/>
+        <a:font script="Beng" typeface="Vrinda"/>
+        <a:font script="Gujr" typeface="Shruti"/>
+        <a:font script="Khmr" typeface="MoolBoran"/>
+        <a:font script="Knda" typeface="Tunga"/>
+        <a:font script="Guru" typeface="Raavi"/>
+        <a:font script="Cans" typeface="Euphemia"/>
+        <a:font script="Cher" typeface="Plantagenet Cherokee"/>
+        <a:font script="Yiii" typeface="Microsoft Yi Baiti"/>
+        <a:font script="Tibt" typeface="Microsoft Himalaya"/>
+        <a:font script="Thaa" typeface="MV Boli"/>
+        <a:font script="Deva" typeface="Mangal"/>
+        <a:font script="Telu" typeface="Gautami"/>
+        <a:font script="Taml" typeface="Latha"/>
+        <a:font script="Syrc" typeface="Estrangelo Edessa"/>
+        <a:font script="Orya" typeface="Kalinga"/>
+        <a:font script="Mlym" typeface="Kartika"/>
+        <a:font script="Laoo" typeface="DokChampa"/>
+        <a:font script="Sinh" typeface="Iskoola Pota"/>
+        <a:font script="Mong" typeface="Mongolian Baiti"/>
+        <a:font script="Viet" typeface="Times New Roman"/>
+        <a:font script="Uigh" typeface="Microsoft Uighur"/>
+        <a:font script="Geor" typeface="Sylfaen"/>
+      </a:majorFont>
+      <a:minorFont>
+        <a:latin typeface="Arial"/>
+        <a:ea typeface=""/>
+        <a:cs typeface=""/>
+        <a:font script="Jpan" typeface="ＭＳ Ｐゴシック"/>
+        <a:font script="Hang" typeface="맑은 고딕"/>
+        <a:font script="Hans" typeface="宋体"/>
+        <a:font script="Hant" typeface="新細明體"/>
+        <a:font script="Arab" typeface="Arial"/>
+        <a:font script="Hebr" typeface="Arial"/>
+        <a:font script="Thai" typeface="Cordia New"/>
+        <a:font script="Ethi" typeface="Nyala"/>
+        <a:font script="Beng" typeface="Vrinda"/>
+        <a:font script="Gujr" typeface="Shruti"/>
+        <a:font script="Khmr" typeface="DaunPenh"/>
+        <a:font script="Knda" typeface="Tunga"/>
+        <a:font script="Guru" typeface="Raavi"/>
+        <a:font script="Cans" typeface="Euphemia"/>
+        <a:font script="Cher" typeface="Plantagenet Cherokee"/>
+        <a:font script="Yiii" typeface="Microsoft Yi Baiti"/>
+        <a:font script="Tibt" typeface="Microsoft Himalaya"/>
+        <a:font script="Thaa" typeface="MV Boli"/>
+        <a:font script="Deva" typeface="Mangal"/>
+        <a:font script="Telu" typeface="Gautami"/>
+        <a:font script="Taml" typeface="Latha"/>
+        <a:font script="Syrc" typeface="Estrangelo Edessa"/>
+        <a:font script="Orya" typeface="Kalinga"/>
+        <a:font script="Mlym" typeface="Kartika"/>
+        <a:font script="Laoo" typeface="DokChampa"/>
+        <a:font script="Sinh" typeface="Iskoola Pota"/>
+        <a:font script="Mong" typeface="Mongolian Baiti"/>
+        <a:font script="Viet" typeface="Arial"/>
+        <a:font script="Uigh" typeface="Microsoft Uighur"/>
+        <a:font script="Geor" typeface="Sylfaen"/>
+      </a:minorFont>
+    </a:fontScheme>
+    <a:fmtScheme name="Office">
+      <a:fillStyleLst>
+        <a:solidFill>
+          <a:schemeClr val="phClr"/>
+        </a:solidFill>
+        <a:gradFill rotWithShape="1">
+          <a:gsLst>
+            <a:gs pos="0">
+              <a:schemeClr val="phClr">
+                <a:tint val="50000"/>
+                <a:satMod val="300000"/>
+              </a:schemeClr>
+            </a:gs>
+            <a:gs pos="35000">
+              <a:schemeClr val="phClr">
+                <a:tint val="37000"/>
+                <a:satMod val="300000"/>
+              </a:schemeClr>
+            </a:gs>
+            <a:gs pos="100000">
+              <a:schemeClr val="phClr">
+                <a:tint val="15000"/>
+                <a:satMod val="350000"/>
+              </a:schemeClr>
+            </a:gs>
+          </a:gsLst>
+          <a:lin ang="16200000" scaled="1"/>
+        </a:gradFill>
+        <a:gradFill rotWithShape="1">
+          <a:gsLst>
+            <a:gs pos="0">
+              <a:schemeClr val="phClr">
+                <a:tint val="100000"/>
+                <a:shade val="100000"/>
+                <a:satMod val="130000"/>
+              </a:schemeClr>
+            </a:gs>
+            <a:gs pos="100000">
+              <a:schemeClr val="phClr">
+                <a:tint val="50000"/>
+                <a:shade val="100000"/>
+                <a:satMod val="350000"/>
+              </a:schemeClr>
+            </a:gs>
+          </a:gsLst>
+          <a:lin ang="16200000" scaled="0"/>
+        </a:gradFill>
+      </a:fillStyleLst>
+      <a:lnStyleLst>
+        <a:ln w="9525" cap="flat" cmpd="sng" algn="ctr">
+          <a:solidFill>
+            <a:schemeClr val="phClr">
+              <a:shade val="95000"/>
+              <a:satMod val="105000"/>
+            </a:schemeClr>
+          </a:solidFill>
+          <a:prstDash val="solid"/>
+        </a:ln>
+        <a:ln w="25400" cap="flat" cmpd="sng" algn="ctr">
+          <a:solidFill>
+            <a:schemeClr val="phClr"/>
+          </a:solidFill>
+          <a:prstDash val="solid"/>
+        </a:ln>
+        <a:ln w="38100" cap="flat" cmpd="sng" algn="ctr">
+          <a:solidFill>
+            <a:schemeClr val="phClr"/>
+          </a:solidFill>
+          <a:prstDash val="solid"/>
+        </a:ln>
+      </a:lnStyleLst>
+      <a:effectStyleLst>
+        <a:effectStyle>
+          <a:effectLst>
+            <a:outerShdw blurRad="40000" dist="20000" dir="5400000" rotWithShape="0">
+              <a:srgbClr val="000000">
+                <a:alpha val="38000"/>
+              </a:srgbClr>
+            </a:outerShdw>
+          </a:effectLst>
+        </a:effectStyle>
+        <a:effectStyle>
+          <a:effectLst>
+            <a:outerShdw blurRad="40000" dist="23000" dir="5400000" rotWithShape="0">
+              <a:srgbClr val="000000">
+                <a:alpha val="35000"/>
+              </a:srgbClr>
+            </a:outerShdw>
+          </a:effectLst>
+        </a:effectStyle>
+        <a:effectStyle>
+          <a:effectLst>
+            <a:outerShdw blurRad="40000" dist="23000" dir="5400000" rotWithShape="0">
+              <a:srgbClr val="000000">
+                <a:alpha val="35000"/>
+              </a:srgbClr>
+            </a:outerShdw>
+          </a:effectLst>
+          <a:scene3d>
+            <a:camera prst="orthographicFront">
+              <a:rot lat="0" lon="0" rev="0"/>
+            </a:camera>
+            <a:lightRig rig="threePt" dir="t">
+              <a:rot lat="0" lon="0" rev="1200000"/>
+            </a:lightRig>
+          </a:scene3d>
+          <a:sp3d>
+            <a:bevelT w="63500" h="25400"/>
+          </a:sp3d>
+        </a:effectStyle>
+      </a:effectStyleLst>
+      <a:bgFillStyleLst>
+        <a:solidFill>
+          <a:schemeClr val="phClr"/>
+        </a:solidFill>
+        <a:gradFill rotWithShape="1">
+          <a:gsLst>
+            <a:gs pos="0">
+              <a:schemeClr val="phClr">
+                <a:tint val="40000"/>
+                <a:satMod val="350000"/>
+              </a:schemeClr>
+            </a:gs>
+            <a:gs pos="40000">
+              <a:schemeClr val="phClr">
+                <a:tint val="45000"/>
+                <a:shade val="99000"/>
+                <a:satMod val="350000"/>
+              </a:schemeClr>
+            </a:gs>
+            <a:gs pos="100000">
+              <a:schemeClr val="phClr">
+                <a:shade val="20000"/>
+                <a:satMod val="255000"/>
+              </a:schemeClr>
+            </a:gs>
+          </a:gsLst>
+          <a:path path="circle">
+            <a:fillToRect l="50000" t="-80000" r="50000" b="180000"/>
+          </a:path>
+        </a:gradFill>
+        <a:gradFill rotWithShape="1">
+          <a:gsLst>
+            <a:gs pos="0">
+              <a:schemeClr val="phClr">
+                <a:tint val="80000"/>
+                <a:satMod val="300000"/>
+              </a:schemeClr>
+            </a:gs>
+            <a:gs pos="100000">
+              <a:schemeClr val="phClr">
+                <a:shade val="30000"/>
+                <a:satMod val="200000"/>
+              </a:schemeClr>
+            </a:gs>
+          </a:gsLst>
+          <a:path path="circle">
+            <a:fillToRect l="50000" t="50000" r="50000" b="50000"/>
+          </a:path>
+        </a:gradFill>
+      </a:bgFillStyleLst>
+    </a:fmtScheme>
+  </a:themeElements>
+</a:theme>
+</file>
+
+<file path=ppt/theme/theme2.xml><?xml version="1.0" encoding="utf-8"?>
 <a:theme xmlns:a="http://schemas.openxmlformats.org/drawingml/2006/main" xmlns:r="http://schemas.openxmlformats.org/officeDocument/2006/relationships" name="Simple Light">
   <a:themeElements>
     <a:clrScheme name="Simple Light">
@@ -28519,283 +31306,4 @@
     </a:fmtScheme>
   </a:themeElements>
 </a:theme>
-</file>
-
-<file path=ppt/theme/theme2.xml><?xml version="1.0" encoding="utf-8"?>
-<a:theme xmlns:a="http://schemas.openxmlformats.org/drawingml/2006/main" xmlns:r="http://schemas.openxmlformats.org/officeDocument/2006/relationships">
-  <a:themeElements>
-    <a:clrScheme name="Default">
-      <a:dk1>
-        <a:srgbClr val="000000"/>
-      </a:dk1>
-      <a:lt1>
-        <a:srgbClr val="FFFFFF"/>
-      </a:lt1>
-      <a:dk2>
-        <a:srgbClr val="158158"/>
-      </a:dk2>
-      <a:lt2>
-        <a:srgbClr val="F3F3F3"/>
-      </a:lt2>
-      <a:accent1>
-        <a:srgbClr val="058DC7"/>
-      </a:accent1>
-      <a:accent2>
-        <a:srgbClr val="50B432"/>
-      </a:accent2>
-      <a:accent3>
-        <a:srgbClr val="ED561B"/>
-      </a:accent3>
-      <a:accent4>
-        <a:srgbClr val="EDEF00"/>
-      </a:accent4>
-      <a:accent5>
-        <a:srgbClr val="24CBE5"/>
-      </a:accent5>
-      <a:accent6>
-        <a:srgbClr val="64E572"/>
-      </a:accent6>
-      <a:hlink>
-        <a:srgbClr val="2200CC"/>
-      </a:hlink>
-      <a:folHlink>
-        <a:srgbClr val="551A8B"/>
-      </a:folHlink>
-    </a:clrScheme>
-    <a:fontScheme name="Office">
-      <a:majorFont>
-        <a:latin typeface="Arial"/>
-        <a:ea typeface=""/>
-        <a:cs typeface=""/>
-        <a:font script="Jpan" typeface="ＭＳ Ｐゴシック"/>
-        <a:font script="Hang" typeface="맑은 고딕"/>
-        <a:font script="Hans" typeface="宋体"/>
-        <a:font script="Hant" typeface="新細明體"/>
-        <a:font script="Arab" typeface="Times New Roman"/>
-        <a:font script="Hebr" typeface="Times New Roman"/>
-        <a:font script="Thai" typeface="Angsana New"/>
-        <a:font script="Ethi" typeface="Nyala"/>
-        <a:font script="Beng" typeface="Vrinda"/>
-        <a:font script="Gujr" typeface="Shruti"/>
-        <a:font script="Khmr" typeface="MoolBoran"/>
-        <a:font script="Knda" typeface="Tunga"/>
-        <a:font script="Guru" typeface="Raavi"/>
-        <a:font script="Cans" typeface="Euphemia"/>
-        <a:font script="Cher" typeface="Plantagenet Cherokee"/>
-        <a:font script="Yiii" typeface="Microsoft Yi Baiti"/>
-        <a:font script="Tibt" typeface="Microsoft Himalaya"/>
-        <a:font script="Thaa" typeface="MV Boli"/>
-        <a:font script="Deva" typeface="Mangal"/>
-        <a:font script="Telu" typeface="Gautami"/>
-        <a:font script="Taml" typeface="Latha"/>
-        <a:font script="Syrc" typeface="Estrangelo Edessa"/>
-        <a:font script="Orya" typeface="Kalinga"/>
-        <a:font script="Mlym" typeface="Kartika"/>
-        <a:font script="Laoo" typeface="DokChampa"/>
-        <a:font script="Sinh" typeface="Iskoola Pota"/>
-        <a:font script="Mong" typeface="Mongolian Baiti"/>
-        <a:font script="Viet" typeface="Times New Roman"/>
-        <a:font script="Uigh" typeface="Microsoft Uighur"/>
-        <a:font script="Geor" typeface="Sylfaen"/>
-      </a:majorFont>
-      <a:minorFont>
-        <a:latin typeface="Arial"/>
-        <a:ea typeface=""/>
-        <a:cs typeface=""/>
-        <a:font script="Jpan" typeface="ＭＳ Ｐゴシック"/>
-        <a:font script="Hang" typeface="맑은 고딕"/>
-        <a:font script="Hans" typeface="宋体"/>
-        <a:font script="Hant" typeface="新細明體"/>
-        <a:font script="Arab" typeface="Arial"/>
-        <a:font script="Hebr" typeface="Arial"/>
-        <a:font script="Thai" typeface="Cordia New"/>
-        <a:font script="Ethi" typeface="Nyala"/>
-        <a:font script="Beng" typeface="Vrinda"/>
-        <a:font script="Gujr" typeface="Shruti"/>
-        <a:font script="Khmr" typeface="DaunPenh"/>
-        <a:font script="Knda" typeface="Tunga"/>
-        <a:font script="Guru" typeface="Raavi"/>
-        <a:font script="Cans" typeface="Euphemia"/>
-        <a:font script="Cher" typeface="Plantagenet Cherokee"/>
-        <a:font script="Yiii" typeface="Microsoft Yi Baiti"/>
-        <a:font script="Tibt" typeface="Microsoft Himalaya"/>
-        <a:font script="Thaa" typeface="MV Boli"/>
-        <a:font script="Deva" typeface="Mangal"/>
-        <a:font script="Telu" typeface="Gautami"/>
-        <a:font script="Taml" typeface="Latha"/>
-        <a:font script="Syrc" typeface="Estrangelo Edessa"/>
-        <a:font script="Orya" typeface="Kalinga"/>
-        <a:font script="Mlym" typeface="Kartika"/>
-        <a:font script="Laoo" typeface="DokChampa"/>
-        <a:font script="Sinh" typeface="Iskoola Pota"/>
-        <a:font script="Mong" typeface="Mongolian Baiti"/>
-        <a:font script="Viet" typeface="Arial"/>
-        <a:font script="Uigh" typeface="Microsoft Uighur"/>
-        <a:font script="Geor" typeface="Sylfaen"/>
-      </a:minorFont>
-    </a:fontScheme>
-    <a:fmtScheme name="Office">
-      <a:fillStyleLst>
-        <a:solidFill>
-          <a:schemeClr val="phClr"/>
-        </a:solidFill>
-        <a:gradFill rotWithShape="1">
-          <a:gsLst>
-            <a:gs pos="0">
-              <a:schemeClr val="phClr">
-                <a:tint val="50000"/>
-                <a:satMod val="300000"/>
-              </a:schemeClr>
-            </a:gs>
-            <a:gs pos="35000">
-              <a:schemeClr val="phClr">
-                <a:tint val="37000"/>
-                <a:satMod val="300000"/>
-              </a:schemeClr>
-            </a:gs>
-            <a:gs pos="100000">
-              <a:schemeClr val="phClr">
-                <a:tint val="15000"/>
-                <a:satMod val="350000"/>
-              </a:schemeClr>
-            </a:gs>
-          </a:gsLst>
-          <a:lin ang="16200000" scaled="1"/>
-        </a:gradFill>
-        <a:gradFill rotWithShape="1">
-          <a:gsLst>
-            <a:gs pos="0">
-              <a:schemeClr val="phClr">
-                <a:tint val="100000"/>
-                <a:shade val="100000"/>
-                <a:satMod val="130000"/>
-              </a:schemeClr>
-            </a:gs>
-            <a:gs pos="100000">
-              <a:schemeClr val="phClr">
-                <a:tint val="50000"/>
-                <a:shade val="100000"/>
-                <a:satMod val="350000"/>
-              </a:schemeClr>
-            </a:gs>
-          </a:gsLst>
-          <a:lin ang="16200000" scaled="0"/>
-        </a:gradFill>
-      </a:fillStyleLst>
-      <a:lnStyleLst>
-        <a:ln w="9525" cap="flat" cmpd="sng" algn="ctr">
-          <a:solidFill>
-            <a:schemeClr val="phClr">
-              <a:shade val="95000"/>
-              <a:satMod val="105000"/>
-            </a:schemeClr>
-          </a:solidFill>
-          <a:prstDash val="solid"/>
-        </a:ln>
-        <a:ln w="25400" cap="flat" cmpd="sng" algn="ctr">
-          <a:solidFill>
-            <a:schemeClr val="phClr"/>
-          </a:solidFill>
-          <a:prstDash val="solid"/>
-        </a:ln>
-        <a:ln w="38100" cap="flat" cmpd="sng" algn="ctr">
-          <a:solidFill>
-            <a:schemeClr val="phClr"/>
-          </a:solidFill>
-          <a:prstDash val="solid"/>
-        </a:ln>
-      </a:lnStyleLst>
-      <a:effectStyleLst>
-        <a:effectStyle>
-          <a:effectLst>
-            <a:outerShdw blurRad="40000" dist="20000" dir="5400000" rotWithShape="0">
-              <a:srgbClr val="000000">
-                <a:alpha val="38000"/>
-              </a:srgbClr>
-            </a:outerShdw>
-          </a:effectLst>
-        </a:effectStyle>
-        <a:effectStyle>
-          <a:effectLst>
-            <a:outerShdw blurRad="40000" dist="23000" dir="5400000" rotWithShape="0">
-              <a:srgbClr val="000000">
-                <a:alpha val="35000"/>
-              </a:srgbClr>
-            </a:outerShdw>
-          </a:effectLst>
-        </a:effectStyle>
-        <a:effectStyle>
-          <a:effectLst>
-            <a:outerShdw blurRad="40000" dist="23000" dir="5400000" rotWithShape="0">
-              <a:srgbClr val="000000">
-                <a:alpha val="35000"/>
-              </a:srgbClr>
-            </a:outerShdw>
-          </a:effectLst>
-          <a:scene3d>
-            <a:camera prst="orthographicFront">
-              <a:rot lat="0" lon="0" rev="0"/>
-            </a:camera>
-            <a:lightRig rig="threePt" dir="t">
-              <a:rot lat="0" lon="0" rev="1200000"/>
-            </a:lightRig>
-          </a:scene3d>
-          <a:sp3d>
-            <a:bevelT w="63500" h="25400"/>
-          </a:sp3d>
-        </a:effectStyle>
-      </a:effectStyleLst>
-      <a:bgFillStyleLst>
-        <a:solidFill>
-          <a:schemeClr val="phClr"/>
-        </a:solidFill>
-        <a:gradFill rotWithShape="1">
-          <a:gsLst>
-            <a:gs pos="0">
-              <a:schemeClr val="phClr">
-                <a:tint val="40000"/>
-                <a:satMod val="350000"/>
-              </a:schemeClr>
-            </a:gs>
-            <a:gs pos="40000">
-              <a:schemeClr val="phClr">
-                <a:tint val="45000"/>
-                <a:shade val="99000"/>
-                <a:satMod val="350000"/>
-              </a:schemeClr>
-            </a:gs>
-            <a:gs pos="100000">
-              <a:schemeClr val="phClr">
-                <a:shade val="20000"/>
-                <a:satMod val="255000"/>
-              </a:schemeClr>
-            </a:gs>
-          </a:gsLst>
-          <a:path path="circle">
-            <a:fillToRect l="50000" t="-80000" r="50000" b="180000"/>
-          </a:path>
-        </a:gradFill>
-        <a:gradFill rotWithShape="1">
-          <a:gsLst>
-            <a:gs pos="0">
-              <a:schemeClr val="phClr">
-                <a:tint val="80000"/>
-                <a:satMod val="300000"/>
-              </a:schemeClr>
-            </a:gs>
-            <a:gs pos="100000">
-              <a:schemeClr val="phClr">
-                <a:shade val="30000"/>
-                <a:satMod val="200000"/>
-              </a:schemeClr>
-            </a:gs>
-          </a:gsLst>
-          <a:path path="circle">
-            <a:fillToRect l="50000" t="50000" r="50000" b="50000"/>
-          </a:path>
-        </a:gradFill>
-      </a:bgFillStyleLst>
-    </a:fmtScheme>
-  </a:themeElements>
-</a:theme>
 </file>
</xml_diff>